<commit_message>
Added some slides regarding the problem specification
</commit_message>
<xml_diff>
--- a/Presentation.pptx
+++ b/Presentation.pptx
@@ -1,24 +1,27 @@
 
 <file path=ppt/presentation.xml><?xml version="1.0" encoding="utf-8"?>
-<p:presentation xmlns:a="http://schemas.openxmlformats.org/drawingml/2006/main" xmlns:r="http://schemas.openxmlformats.org/officeDocument/2006/relationships" xmlns:p="http://schemas.openxmlformats.org/presentationml/2006/main" saveSubsetFonts="1">
+<p:presentation xmlns:a="http://schemas.openxmlformats.org/drawingml/2006/main" xmlns:r="http://schemas.openxmlformats.org/officeDocument/2006/relationships" xmlns:p="http://schemas.openxmlformats.org/presentationml/2006/main" showSpecialPlsOnTitleSld="0" saveSubsetFonts="1">
   <p:sldMasterIdLst>
-    <p:sldMasterId id="2147483676" r:id="rId1"/>
+    <p:sldMasterId id="2147483648" r:id="rId1"/>
   </p:sldMasterIdLst>
   <p:notesMasterIdLst>
-    <p:notesMasterId r:id="rId4"/>
+    <p:notesMasterId r:id="rId7"/>
   </p:notesMasterIdLst>
   <p:handoutMasterIdLst>
-    <p:handoutMasterId r:id="rId5"/>
+    <p:handoutMasterId r:id="rId8"/>
   </p:handoutMasterIdLst>
   <p:sldIdLst>
-    <p:sldId id="256" r:id="rId2"/>
-    <p:sldId id="264" r:id="rId3"/>
+    <p:sldId id="273" r:id="rId2"/>
+    <p:sldId id="274" r:id="rId3"/>
+    <p:sldId id="278" r:id="rId4"/>
+    <p:sldId id="276" r:id="rId5"/>
+    <p:sldId id="275" r:id="rId6"/>
   </p:sldIdLst>
   <p:sldSz cx="9144000" cy="6858000" type="screen4x3"/>
   <p:notesSz cx="6858000" cy="9144000"/>
   <p:defaultTextStyle>
     <a:defPPr>
-      <a:defRPr lang="en-GB"/>
+      <a:defRPr lang="de-DE"/>
     </a:defPPr>
     <a:lvl1pPr algn="l" rtl="0" fontAlgn="base">
       <a:spcBef>
@@ -142,6 +145,23 @@
     </a:lvl9pPr>
   </p:defaultTextStyle>
   <p:extLst>
+    <p:ext uri="{521415D9-36F7-43E2-AB2F-B90AF26B5E84}">
+      <p14:sectionLst xmlns:p14="http://schemas.microsoft.com/office/powerpoint/2010/main">
+        <p14:section name="Standardabschnitt" id="{909E92D7-FFF5-4FA6-9BD6-1FACEF6B7C7A}">
+          <p14:sldIdLst>
+            <p14:sldId id="273"/>
+            <p14:sldId id="274"/>
+            <p14:sldId id="278"/>
+            <p14:sldId id="276"/>
+          </p14:sldIdLst>
+        </p14:section>
+        <p14:section name="Abschnitt ohne Titel" id="{2CF6B75E-427E-4D19-AC20-313B2DFC7141}">
+          <p14:sldIdLst>
+            <p14:sldId id="275"/>
+          </p14:sldIdLst>
+        </p14:section>
+      </p14:sectionLst>
+    </p:ext>
     <p:ext uri="{EFAFB233-063F-42B5-8137-9DF3F51BA10A}">
       <p15:sldGuideLst xmlns:p15="http://schemas.microsoft.com/office/powerpoint/2012/main">
         <p15:guide id="1" orient="horz" pos="2160">
@@ -157,18 +177,7 @@
       </p15:sldGuideLst>
     </p:ext>
     <p:ext uri="{2D200454-40CA-4A62-9FC3-DE9A4176ACB9}">
-      <p15:notesGuideLst xmlns:p15="http://schemas.microsoft.com/office/powerpoint/2012/main">
-        <p15:guide id="1" orient="horz" pos="2880">
-          <p15:clr>
-            <a:srgbClr val="A4A3A4"/>
-          </p15:clr>
-        </p15:guide>
-        <p15:guide id="2" pos="2160">
-          <p15:clr>
-            <a:srgbClr val="A4A3A4"/>
-          </p15:clr>
-        </p15:guide>
-      </p15:notesGuideLst>
+      <p15:notesGuideLst xmlns:p15="http://schemas.microsoft.com/office/powerpoint/2012/main"/>
     </p:ext>
   </p:extLst>
 </p:presentation>
@@ -201,259 +210,30 @@
       </p:grpSpPr>
       <p:sp>
         <p:nvSpPr>
-          <p:cNvPr id="184322" name="Rectangle 2"/>
+          <p:cNvPr id="47108" name="Rectangle 4"/>
           <p:cNvSpPr>
             <a:spLocks noGrp="1" noChangeArrowheads="1"/>
           </p:cNvSpPr>
           <p:nvPr>
-            <p:ph type="hdr" sz="quarter"/>
+            <p:ph type="ftr" sz="quarter" idx="2"/>
           </p:nvPr>
         </p:nvSpPr>
         <p:spPr bwMode="auto">
           <a:xfrm>
-            <a:off x="0" y="0"/>
-            <a:ext cx="2971800" cy="457200"/>
+            <a:off x="3660775" y="468313"/>
+            <a:ext cx="2759075" cy="279400"/>
           </a:xfrm>
           <a:prstGeom prst="rect">
             <a:avLst/>
           </a:prstGeom>
           <a:noFill/>
-          <a:ln>
+          <a:ln w="9525">
             <a:noFill/>
+            <a:miter lim="800000"/>
+            <a:headEnd/>
+            <a:tailEnd/>
           </a:ln>
           <a:effectLst/>
-          <a:extLst>
-            <a:ext uri="{909E8E84-426E-40DD-AFC4-6F175D3DCCD1}">
-              <a14:hiddenFill xmlns:a14="http://schemas.microsoft.com/office/drawing/2010/main">
-                <a:solidFill>
-                  <a:schemeClr val="accent1"/>
-                </a:solidFill>
-              </a14:hiddenFill>
-            </a:ext>
-            <a:ext uri="{91240B29-F687-4F45-9708-019B960494DF}">
-              <a14:hiddenLine xmlns:a14="http://schemas.microsoft.com/office/drawing/2010/main" w="9525">
-                <a:solidFill>
-                  <a:schemeClr val="tx1"/>
-                </a:solidFill>
-                <a:miter lim="800000"/>
-                <a:headEnd/>
-                <a:tailEnd/>
-              </a14:hiddenLine>
-            </a:ext>
-            <a:ext uri="{AF507438-7753-43E0-B8FC-AC1667EBCBE1}">
-              <a14:hiddenEffects xmlns:a14="http://schemas.microsoft.com/office/drawing/2010/main">
-                <a:effectLst>
-                  <a:outerShdw dist="35921" dir="2700000" algn="ctr" rotWithShape="0">
-                    <a:schemeClr val="bg2"/>
-                  </a:outerShdw>
-                </a:effectLst>
-              </a14:hiddenEffects>
-            </a:ext>
-          </a:extLst>
-        </p:spPr>
-        <p:txBody>
-          <a:bodyPr vert="horz" wrap="square" lIns="91440" tIns="45720" rIns="91440" bIns="45720" numCol="1" anchor="t" anchorCtr="0" compatLnSpc="1">
-            <a:prstTxWarp prst="textNoShape">
-              <a:avLst/>
-            </a:prstTxWarp>
-          </a:bodyPr>
-          <a:lstStyle>
-            <a:lvl1pPr>
-              <a:defRPr sz="1200"/>
-            </a:lvl1pPr>
-          </a:lstStyle>
-          <a:p>
-            <a:endParaRPr lang="en-GB"/>
-          </a:p>
-        </p:txBody>
-      </p:sp>
-      <p:sp>
-        <p:nvSpPr>
-          <p:cNvPr id="184323" name="Rectangle 3"/>
-          <p:cNvSpPr>
-            <a:spLocks noGrp="1" noChangeArrowheads="1"/>
-          </p:cNvSpPr>
-          <p:nvPr>
-            <p:ph type="dt" sz="quarter" idx="1"/>
-          </p:nvPr>
-        </p:nvSpPr>
-        <p:spPr bwMode="auto">
-          <a:xfrm>
-            <a:off x="3884613" y="0"/>
-            <a:ext cx="2971800" cy="457200"/>
-          </a:xfrm>
-          <a:prstGeom prst="rect">
-            <a:avLst/>
-          </a:prstGeom>
-          <a:noFill/>
-          <a:ln>
-            <a:noFill/>
-          </a:ln>
-          <a:effectLst/>
-          <a:extLst>
-            <a:ext uri="{909E8E84-426E-40DD-AFC4-6F175D3DCCD1}">
-              <a14:hiddenFill xmlns:a14="http://schemas.microsoft.com/office/drawing/2010/main">
-                <a:solidFill>
-                  <a:schemeClr val="accent1"/>
-                </a:solidFill>
-              </a14:hiddenFill>
-            </a:ext>
-            <a:ext uri="{91240B29-F687-4F45-9708-019B960494DF}">
-              <a14:hiddenLine xmlns:a14="http://schemas.microsoft.com/office/drawing/2010/main" w="9525">
-                <a:solidFill>
-                  <a:schemeClr val="tx1"/>
-                </a:solidFill>
-                <a:miter lim="800000"/>
-                <a:headEnd/>
-                <a:tailEnd/>
-              </a14:hiddenLine>
-            </a:ext>
-            <a:ext uri="{AF507438-7753-43E0-B8FC-AC1667EBCBE1}">
-              <a14:hiddenEffects xmlns:a14="http://schemas.microsoft.com/office/drawing/2010/main">
-                <a:effectLst>
-                  <a:outerShdw dist="35921" dir="2700000" algn="ctr" rotWithShape="0">
-                    <a:schemeClr val="bg2"/>
-                  </a:outerShdw>
-                </a:effectLst>
-              </a14:hiddenEffects>
-            </a:ext>
-          </a:extLst>
-        </p:spPr>
-        <p:txBody>
-          <a:bodyPr vert="horz" wrap="square" lIns="91440" tIns="45720" rIns="91440" bIns="45720" numCol="1" anchor="t" anchorCtr="0" compatLnSpc="1">
-            <a:prstTxWarp prst="textNoShape">
-              <a:avLst/>
-            </a:prstTxWarp>
-          </a:bodyPr>
-          <a:lstStyle>
-            <a:lvl1pPr algn="r">
-              <a:defRPr sz="1200"/>
-            </a:lvl1pPr>
-          </a:lstStyle>
-          <a:p>
-            <a:endParaRPr lang="en-GB"/>
-          </a:p>
-        </p:txBody>
-      </p:sp>
-      <p:sp>
-        <p:nvSpPr>
-          <p:cNvPr id="184324" name="Rectangle 4"/>
-          <p:cNvSpPr>
-            <a:spLocks noGrp="1" noChangeArrowheads="1"/>
-          </p:cNvSpPr>
-          <p:nvPr>
-            <p:ph type="ftr" sz="quarter" idx="2"/>
-          </p:nvPr>
-        </p:nvSpPr>
-        <p:spPr bwMode="auto">
-          <a:xfrm>
-            <a:off x="0" y="8685213"/>
-            <a:ext cx="2971800" cy="457200"/>
-          </a:xfrm>
-          <a:prstGeom prst="rect">
-            <a:avLst/>
-          </a:prstGeom>
-          <a:noFill/>
-          <a:ln>
-            <a:noFill/>
-          </a:ln>
-          <a:effectLst/>
-          <a:extLst>
-            <a:ext uri="{909E8E84-426E-40DD-AFC4-6F175D3DCCD1}">
-              <a14:hiddenFill xmlns:a14="http://schemas.microsoft.com/office/drawing/2010/main">
-                <a:solidFill>
-                  <a:schemeClr val="accent1"/>
-                </a:solidFill>
-              </a14:hiddenFill>
-            </a:ext>
-            <a:ext uri="{91240B29-F687-4F45-9708-019B960494DF}">
-              <a14:hiddenLine xmlns:a14="http://schemas.microsoft.com/office/drawing/2010/main" w="9525">
-                <a:solidFill>
-                  <a:schemeClr val="tx1"/>
-                </a:solidFill>
-                <a:miter lim="800000"/>
-                <a:headEnd/>
-                <a:tailEnd/>
-              </a14:hiddenLine>
-            </a:ext>
-            <a:ext uri="{AF507438-7753-43E0-B8FC-AC1667EBCBE1}">
-              <a14:hiddenEffects xmlns:a14="http://schemas.microsoft.com/office/drawing/2010/main">
-                <a:effectLst>
-                  <a:outerShdw dist="35921" dir="2700000" algn="ctr" rotWithShape="0">
-                    <a:schemeClr val="bg2"/>
-                  </a:outerShdw>
-                </a:effectLst>
-              </a14:hiddenEffects>
-            </a:ext>
-          </a:extLst>
-        </p:spPr>
-        <p:txBody>
-          <a:bodyPr vert="horz" wrap="square" lIns="91440" tIns="45720" rIns="91440" bIns="45720" numCol="1" anchor="b" anchorCtr="0" compatLnSpc="1">
-            <a:prstTxWarp prst="textNoShape">
-              <a:avLst/>
-            </a:prstTxWarp>
-          </a:bodyPr>
-          <a:lstStyle>
-            <a:lvl1pPr>
-              <a:defRPr sz="1200"/>
-            </a:lvl1pPr>
-          </a:lstStyle>
-          <a:p>
-            <a:endParaRPr lang="en-GB"/>
-          </a:p>
-        </p:txBody>
-      </p:sp>
-      <p:sp>
-        <p:nvSpPr>
-          <p:cNvPr id="184325" name="Rectangle 5"/>
-          <p:cNvSpPr>
-            <a:spLocks noGrp="1" noChangeArrowheads="1"/>
-          </p:cNvSpPr>
-          <p:nvPr>
-            <p:ph type="sldNum" sz="quarter" idx="3"/>
-          </p:nvPr>
-        </p:nvSpPr>
-        <p:spPr bwMode="auto">
-          <a:xfrm>
-            <a:off x="3884613" y="8685213"/>
-            <a:ext cx="2971800" cy="457200"/>
-          </a:xfrm>
-          <a:prstGeom prst="rect">
-            <a:avLst/>
-          </a:prstGeom>
-          <a:noFill/>
-          <a:ln>
-            <a:noFill/>
-          </a:ln>
-          <a:effectLst/>
-          <a:extLst>
-            <a:ext uri="{909E8E84-426E-40DD-AFC4-6F175D3DCCD1}">
-              <a14:hiddenFill xmlns:a14="http://schemas.microsoft.com/office/drawing/2010/main">
-                <a:solidFill>
-                  <a:schemeClr val="accent1"/>
-                </a:solidFill>
-              </a14:hiddenFill>
-            </a:ext>
-            <a:ext uri="{91240B29-F687-4F45-9708-019B960494DF}">
-              <a14:hiddenLine xmlns:a14="http://schemas.microsoft.com/office/drawing/2010/main" w="9525">
-                <a:solidFill>
-                  <a:schemeClr val="tx1"/>
-                </a:solidFill>
-                <a:miter lim="800000"/>
-                <a:headEnd/>
-                <a:tailEnd/>
-              </a14:hiddenLine>
-            </a:ext>
-            <a:ext uri="{AF507438-7753-43E0-B8FC-AC1667EBCBE1}">
-              <a14:hiddenEffects xmlns:a14="http://schemas.microsoft.com/office/drawing/2010/main">
-                <a:effectLst>
-                  <a:outerShdw dist="35921" dir="2700000" algn="ctr" rotWithShape="0">
-                    <a:schemeClr val="bg2"/>
-                  </a:outerShdw>
-                </a:effectLst>
-              </a14:hiddenEffects>
-            </a:ext>
-          </a:extLst>
         </p:spPr>
         <p:txBody>
           <a:bodyPr vert="horz" wrap="square" lIns="91440" tIns="45720" rIns="91440" bIns="45720" numCol="1" anchor="b" anchorCtr="0" compatLnSpc="1">
@@ -463,27 +243,117 @@
           </a:bodyPr>
           <a:lstStyle>
             <a:lvl1pPr algn="r">
-              <a:defRPr sz="1200"/>
+              <a:defRPr sz="800">
+                <a:latin typeface="Arial" charset="0"/>
+              </a:defRPr>
             </a:lvl1pPr>
           </a:lstStyle>
           <a:p>
-            <a:fld id="{08F522DE-2595-4211-9733-08C10CCE2945}" type="slidenum">
-              <a:rPr lang="en-GB"/>
-              <a:pPr/>
-              <a:t>‹Nr.›</a:t>
-            </a:fld>
-            <a:endParaRPr lang="en-GB"/>
-          </a:p>
-        </p:txBody>
-      </p:sp>
+            <a:pPr>
+              <a:defRPr/>
+            </a:pPr>
+            <a:r>
+              <a:rPr lang="de-DE"/>
+              <a:t>Prof. Dr. Max Mustermann | Musterfakultät</a:t>
+            </a:r>
+          </a:p>
+        </p:txBody>
+      </p:sp>
+      <p:sp>
+        <p:nvSpPr>
+          <p:cNvPr id="47111" name="Text Box 7"/>
+          <p:cNvSpPr txBox="1">
+            <a:spLocks noChangeArrowheads="1"/>
+          </p:cNvSpPr>
+          <p:nvPr/>
+        </p:nvSpPr>
+        <p:spPr bwMode="auto">
+          <a:xfrm>
+            <a:off x="541338" y="8532813"/>
+            <a:ext cx="3103562" cy="244475"/>
+          </a:xfrm>
+          <a:prstGeom prst="rect">
+            <a:avLst/>
+          </a:prstGeom>
+          <a:noFill/>
+          <a:ln w="9525">
+            <a:noFill/>
+            <a:miter lim="800000"/>
+            <a:headEnd/>
+            <a:tailEnd/>
+          </a:ln>
+          <a:effectLst/>
+        </p:spPr>
+        <p:txBody>
+          <a:bodyPr lIns="0" tIns="0" rIns="0" bIns="0">
+            <a:spAutoFit/>
+          </a:bodyPr>
+          <a:lstStyle/>
+          <a:p>
+            <a:pPr>
+              <a:defRPr/>
+            </a:pPr>
+            <a:r>
+              <a:rPr lang="en-US" sz="800">
+                <a:latin typeface="Arial" pitchFamily="34" charset="0"/>
+              </a:rPr>
+              <a:t>KIT – University of the State of Baden-Wuerttemberg and </a:t>
+            </a:r>
+            <a:br>
+              <a:rPr lang="en-US" sz="800">
+                <a:latin typeface="Arial" pitchFamily="34" charset="0"/>
+              </a:rPr>
+            </a:br>
+            <a:r>
+              <a:rPr lang="en-US" sz="800">
+                <a:latin typeface="Arial" pitchFamily="34" charset="0"/>
+              </a:rPr>
+              <a:t>National Laboratory of the Helmholtz Association</a:t>
+            </a:r>
+          </a:p>
+        </p:txBody>
+      </p:sp>
+      <p:pic>
+        <p:nvPicPr>
+          <p:cNvPr id="6148" name="Picture 11" descr="KIT-Logo-rgb_de"/>
+          <p:cNvPicPr>
+            <a:picLocks noChangeAspect="1" noChangeArrowheads="1"/>
+          </p:cNvPicPr>
+          <p:nvPr/>
+        </p:nvPicPr>
+        <p:blipFill>
+          <a:blip r:embed="rId2" cstate="print"/>
+          <a:srcRect/>
+          <a:stretch>
+            <a:fillRect/>
+          </a:stretch>
+        </p:blipFill>
+        <p:spPr bwMode="auto">
+          <a:xfrm>
+            <a:off x="549275" y="188913"/>
+            <a:ext cx="1008063" cy="465137"/>
+          </a:xfrm>
+          <a:prstGeom prst="rect">
+            <a:avLst/>
+          </a:prstGeom>
+          <a:noFill/>
+          <a:ln w="9525">
+            <a:noFill/>
+            <a:miter lim="800000"/>
+            <a:headEnd/>
+            <a:tailEnd/>
+          </a:ln>
+        </p:spPr>
+      </p:pic>
     </p:spTree>
     <p:extLst>
       <p:ext uri="{BB962C8B-B14F-4D97-AF65-F5344CB8AC3E}">
-        <p14:creationId xmlns:p14="http://schemas.microsoft.com/office/powerpoint/2010/main" val="3370567438"/>
+        <p14:creationId xmlns:p14="http://schemas.microsoft.com/office/powerpoint/2010/main" val="1659632688"/>
       </p:ext>
     </p:extLst>
   </p:cSld>
   <p:clrMap bg1="lt1" tx1="dk1" bg2="lt2" tx2="dk2" accent1="accent1" accent2="accent2" accent3="accent3" accent4="accent4" accent5="accent5" accent6="accent6" hlink="hlink" folHlink="folHlink"/>
+  <p:hf hdr="0" ftr="0" dt="0"/>
 </p:handoutMaster>
 </file>
 
@@ -514,7 +384,7 @@
       </p:grpSpPr>
       <p:sp>
         <p:nvSpPr>
-          <p:cNvPr id="10242" name="Rectangle 2"/>
+          <p:cNvPr id="3074" name="Rectangle 2"/>
           <p:cNvSpPr>
             <a:spLocks noGrp="1" noChangeArrowheads="1"/>
           </p:cNvSpPr>
@@ -531,38 +401,13 @@
             <a:avLst/>
           </a:prstGeom>
           <a:noFill/>
-          <a:ln>
+          <a:ln w="9525">
             <a:noFill/>
+            <a:miter lim="800000"/>
+            <a:headEnd/>
+            <a:tailEnd/>
           </a:ln>
           <a:effectLst/>
-          <a:extLst>
-            <a:ext uri="{909E8E84-426E-40DD-AFC4-6F175D3DCCD1}">
-              <a14:hiddenFill xmlns:a14="http://schemas.microsoft.com/office/drawing/2010/main">
-                <a:solidFill>
-                  <a:schemeClr val="accent1"/>
-                </a:solidFill>
-              </a14:hiddenFill>
-            </a:ext>
-            <a:ext uri="{91240B29-F687-4F45-9708-019B960494DF}">
-              <a14:hiddenLine xmlns:a14="http://schemas.microsoft.com/office/drawing/2010/main" w="9525">
-                <a:solidFill>
-                  <a:schemeClr val="tx1"/>
-                </a:solidFill>
-                <a:miter lim="800000"/>
-                <a:headEnd/>
-                <a:tailEnd/>
-              </a14:hiddenLine>
-            </a:ext>
-            <a:ext uri="{AF507438-7753-43E0-B8FC-AC1667EBCBE1}">
-              <a14:hiddenEffects xmlns:a14="http://schemas.microsoft.com/office/drawing/2010/main">
-                <a:effectLst>
-                  <a:outerShdw dist="35921" dir="2700000" algn="ctr" rotWithShape="0">
-                    <a:schemeClr val="bg2"/>
-                  </a:outerShdw>
-                </a:effectLst>
-              </a14:hiddenEffects>
-            </a:ext>
-          </a:extLst>
         </p:spPr>
         <p:txBody>
           <a:bodyPr vert="horz" wrap="square" lIns="91440" tIns="45720" rIns="91440" bIns="45720" numCol="1" anchor="t" anchorCtr="0" compatLnSpc="1">
@@ -572,17 +417,22 @@
           </a:bodyPr>
           <a:lstStyle>
             <a:lvl1pPr>
-              <a:defRPr sz="1200"/>
+              <a:defRPr sz="1200">
+                <a:latin typeface="Arial" charset="0"/>
+              </a:defRPr>
             </a:lvl1pPr>
           </a:lstStyle>
           <a:p>
-            <a:endParaRPr lang="en-GB"/>
-          </a:p>
-        </p:txBody>
-      </p:sp>
-      <p:sp>
-        <p:nvSpPr>
-          <p:cNvPr id="10243" name="Rectangle 3"/>
+            <a:pPr>
+              <a:defRPr/>
+            </a:pPr>
+            <a:endParaRPr lang="de-DE"/>
+          </a:p>
+        </p:txBody>
+      </p:sp>
+      <p:sp>
+        <p:nvSpPr>
+          <p:cNvPr id="3075" name="Rectangle 3"/>
           <p:cNvSpPr>
             <a:spLocks noGrp="1" noChangeArrowheads="1"/>
           </p:cNvSpPr>
@@ -599,38 +449,13 @@
             <a:avLst/>
           </a:prstGeom>
           <a:noFill/>
-          <a:ln>
+          <a:ln w="9525">
             <a:noFill/>
+            <a:miter lim="800000"/>
+            <a:headEnd/>
+            <a:tailEnd/>
           </a:ln>
           <a:effectLst/>
-          <a:extLst>
-            <a:ext uri="{909E8E84-426E-40DD-AFC4-6F175D3DCCD1}">
-              <a14:hiddenFill xmlns:a14="http://schemas.microsoft.com/office/drawing/2010/main">
-                <a:solidFill>
-                  <a:schemeClr val="accent1"/>
-                </a:solidFill>
-              </a14:hiddenFill>
-            </a:ext>
-            <a:ext uri="{91240B29-F687-4F45-9708-019B960494DF}">
-              <a14:hiddenLine xmlns:a14="http://schemas.microsoft.com/office/drawing/2010/main" w="9525">
-                <a:solidFill>
-                  <a:schemeClr val="tx1"/>
-                </a:solidFill>
-                <a:miter lim="800000"/>
-                <a:headEnd/>
-                <a:tailEnd/>
-              </a14:hiddenLine>
-            </a:ext>
-            <a:ext uri="{AF507438-7753-43E0-B8FC-AC1667EBCBE1}">
-              <a14:hiddenEffects xmlns:a14="http://schemas.microsoft.com/office/drawing/2010/main">
-                <a:effectLst>
-                  <a:outerShdw dist="35921" dir="2700000" algn="ctr" rotWithShape="0">
-                    <a:schemeClr val="bg2"/>
-                  </a:outerShdw>
-                </a:effectLst>
-              </a14:hiddenEffects>
-            </a:ext>
-          </a:extLst>
         </p:spPr>
         <p:txBody>
           <a:bodyPr vert="horz" wrap="square" lIns="91440" tIns="45720" rIns="91440" bIns="45720" numCol="1" anchor="t" anchorCtr="0" compatLnSpc="1">
@@ -640,17 +465,22 @@
           </a:bodyPr>
           <a:lstStyle>
             <a:lvl1pPr algn="r">
-              <a:defRPr sz="1200"/>
+              <a:defRPr sz="1200">
+                <a:latin typeface="Arial" charset="0"/>
+              </a:defRPr>
             </a:lvl1pPr>
           </a:lstStyle>
           <a:p>
-            <a:endParaRPr lang="en-GB"/>
-          </a:p>
-        </p:txBody>
-      </p:sp>
-      <p:sp>
-        <p:nvSpPr>
-          <p:cNvPr id="10244" name="Rectangle 4"/>
+            <a:pPr>
+              <a:defRPr/>
+            </a:pPr>
+            <a:endParaRPr lang="de-DE"/>
+          </a:p>
+        </p:txBody>
+      </p:sp>
+      <p:sp>
+        <p:nvSpPr>
+          <p:cNvPr id="5124" name="Rectangle 4"/>
           <p:cNvSpPr>
             <a:spLocks noGrp="1" noRot="1" noChangeAspect="1" noChangeArrowheads="1" noTextEdit="1"/>
           </p:cNvSpPr>
@@ -675,26 +505,11 @@
             <a:headEnd/>
             <a:tailEnd/>
           </a:ln>
-          <a:effectLst/>
-          <a:extLst>
-            <a:ext uri="{AF507438-7753-43E0-B8FC-AC1667EBCBE1}">
-              <a14:hiddenEffects xmlns:a14="http://schemas.microsoft.com/office/drawing/2010/main">
-                <a:effectLst>
-                  <a:outerShdw dist="35921" dir="2700000" algn="ctr" rotWithShape="0">
-                    <a:srgbClr val="808080"/>
-                  </a:outerShdw>
-                </a:effectLst>
-              </a14:hiddenEffects>
-            </a:ext>
-            <a:ext uri="{53640926-AAD7-44D8-BBD7-CCE9431645EC}">
-              <a14:shadowObscured xmlns:a14="http://schemas.microsoft.com/office/drawing/2010/main" val="1"/>
-            </a:ext>
-          </a:extLst>
         </p:spPr>
       </p:sp>
       <p:sp>
         <p:nvSpPr>
-          <p:cNvPr id="10245" name="Rectangle 5"/>
+          <p:cNvPr id="3077" name="Rectangle 5"/>
           <p:cNvSpPr>
             <a:spLocks noGrp="1" noChangeArrowheads="1"/>
           </p:cNvSpPr>
@@ -711,38 +526,13 @@
             <a:avLst/>
           </a:prstGeom>
           <a:noFill/>
-          <a:ln>
+          <a:ln w="9525">
             <a:noFill/>
+            <a:miter lim="800000"/>
+            <a:headEnd/>
+            <a:tailEnd/>
           </a:ln>
           <a:effectLst/>
-          <a:extLst>
-            <a:ext uri="{909E8E84-426E-40DD-AFC4-6F175D3DCCD1}">
-              <a14:hiddenFill xmlns:a14="http://schemas.microsoft.com/office/drawing/2010/main">
-                <a:solidFill>
-                  <a:schemeClr val="accent1"/>
-                </a:solidFill>
-              </a14:hiddenFill>
-            </a:ext>
-            <a:ext uri="{91240B29-F687-4F45-9708-019B960494DF}">
-              <a14:hiddenLine xmlns:a14="http://schemas.microsoft.com/office/drawing/2010/main" w="9525">
-                <a:solidFill>
-                  <a:schemeClr val="tx1"/>
-                </a:solidFill>
-                <a:miter lim="800000"/>
-                <a:headEnd/>
-                <a:tailEnd/>
-              </a14:hiddenLine>
-            </a:ext>
-            <a:ext uri="{AF507438-7753-43E0-B8FC-AC1667EBCBE1}">
-              <a14:hiddenEffects xmlns:a14="http://schemas.microsoft.com/office/drawing/2010/main">
-                <a:effectLst>
-                  <a:outerShdw dist="35921" dir="2700000" algn="ctr" rotWithShape="0">
-                    <a:schemeClr val="bg2"/>
-                  </a:outerShdw>
-                </a:effectLst>
-              </a14:hiddenEffects>
-            </a:ext>
-          </a:extLst>
         </p:spPr>
         <p:txBody>
           <a:bodyPr vert="horz" wrap="square" lIns="91440" tIns="45720" rIns="91440" bIns="45720" numCol="1" anchor="t" anchorCtr="0" compatLnSpc="1">
@@ -754,35 +544,35 @@
           <a:p>
             <a:pPr lvl="0"/>
             <a:r>
-              <a:rPr lang="en-GB" smtClean="0"/>
+              <a:rPr lang="de-DE" noProof="0" smtClean="0"/>
               <a:t>Textmasterformate durch Klicken bearbeiten</a:t>
             </a:r>
           </a:p>
           <a:p>
             <a:pPr lvl="1"/>
             <a:r>
-              <a:rPr lang="en-GB" smtClean="0"/>
+              <a:rPr lang="de-DE" noProof="0" smtClean="0"/>
               <a:t>Zweite Ebene</a:t>
             </a:r>
           </a:p>
           <a:p>
             <a:pPr lvl="2"/>
             <a:r>
-              <a:rPr lang="en-GB" smtClean="0"/>
+              <a:rPr lang="de-DE" noProof="0" smtClean="0"/>
               <a:t>Dritte Ebene</a:t>
             </a:r>
           </a:p>
           <a:p>
             <a:pPr lvl="3"/>
             <a:r>
-              <a:rPr lang="en-GB" smtClean="0"/>
+              <a:rPr lang="de-DE" noProof="0" smtClean="0"/>
               <a:t>Vierte Ebene</a:t>
             </a:r>
           </a:p>
           <a:p>
             <a:pPr lvl="4"/>
             <a:r>
-              <a:rPr lang="en-GB" smtClean="0"/>
+              <a:rPr lang="de-DE" noProof="0" smtClean="0"/>
               <a:t>Fünfte Ebene</a:t>
             </a:r>
           </a:p>
@@ -790,7 +580,7 @@
       </p:sp>
       <p:sp>
         <p:nvSpPr>
-          <p:cNvPr id="10246" name="Rectangle 6"/>
+          <p:cNvPr id="3078" name="Rectangle 6"/>
           <p:cNvSpPr>
             <a:spLocks noGrp="1" noChangeArrowheads="1"/>
           </p:cNvSpPr>
@@ -807,38 +597,13 @@
             <a:avLst/>
           </a:prstGeom>
           <a:noFill/>
-          <a:ln>
+          <a:ln w="9525">
             <a:noFill/>
+            <a:miter lim="800000"/>
+            <a:headEnd/>
+            <a:tailEnd/>
           </a:ln>
           <a:effectLst/>
-          <a:extLst>
-            <a:ext uri="{909E8E84-426E-40DD-AFC4-6F175D3DCCD1}">
-              <a14:hiddenFill xmlns:a14="http://schemas.microsoft.com/office/drawing/2010/main">
-                <a:solidFill>
-                  <a:schemeClr val="accent1"/>
-                </a:solidFill>
-              </a14:hiddenFill>
-            </a:ext>
-            <a:ext uri="{91240B29-F687-4F45-9708-019B960494DF}">
-              <a14:hiddenLine xmlns:a14="http://schemas.microsoft.com/office/drawing/2010/main" w="9525">
-                <a:solidFill>
-                  <a:schemeClr val="tx1"/>
-                </a:solidFill>
-                <a:miter lim="800000"/>
-                <a:headEnd/>
-                <a:tailEnd/>
-              </a14:hiddenLine>
-            </a:ext>
-            <a:ext uri="{AF507438-7753-43E0-B8FC-AC1667EBCBE1}">
-              <a14:hiddenEffects xmlns:a14="http://schemas.microsoft.com/office/drawing/2010/main">
-                <a:effectLst>
-                  <a:outerShdw dist="35921" dir="2700000" algn="ctr" rotWithShape="0">
-                    <a:schemeClr val="bg2"/>
-                  </a:outerShdw>
-                </a:effectLst>
-              </a14:hiddenEffects>
-            </a:ext>
-          </a:extLst>
         </p:spPr>
         <p:txBody>
           <a:bodyPr vert="horz" wrap="square" lIns="91440" tIns="45720" rIns="91440" bIns="45720" numCol="1" anchor="b" anchorCtr="0" compatLnSpc="1">
@@ -848,17 +613,32 @@
           </a:bodyPr>
           <a:lstStyle>
             <a:lvl1pPr>
-              <a:defRPr sz="1200"/>
+              <a:defRPr sz="1200">
+                <a:latin typeface="Arial" pitchFamily="34" charset="0"/>
+              </a:defRPr>
             </a:lvl1pPr>
           </a:lstStyle>
           <a:p>
-            <a:endParaRPr lang="en-GB"/>
-          </a:p>
-        </p:txBody>
-      </p:sp>
-      <p:sp>
-        <p:nvSpPr>
-          <p:cNvPr id="10247" name="Rectangle 7"/>
+            <a:pPr>
+              <a:defRPr/>
+            </a:pPr>
+            <a:r>
+              <a:rPr lang="de-DE"/>
+              <a:t>Prof. Dr. Max Mustermann | </a:t>
+            </a:r>
+            <a:br>
+              <a:rPr lang="de-DE"/>
+            </a:br>
+            <a:r>
+              <a:rPr lang="de-DE"/>
+              <a:t>Name of Faculty</a:t>
+            </a:r>
+          </a:p>
+        </p:txBody>
+      </p:sp>
+      <p:sp>
+        <p:nvSpPr>
+          <p:cNvPr id="3079" name="Rectangle 7"/>
           <p:cNvSpPr>
             <a:spLocks noGrp="1" noChangeArrowheads="1"/>
           </p:cNvSpPr>
@@ -875,38 +655,13 @@
             <a:avLst/>
           </a:prstGeom>
           <a:noFill/>
-          <a:ln>
+          <a:ln w="9525">
             <a:noFill/>
+            <a:miter lim="800000"/>
+            <a:headEnd/>
+            <a:tailEnd/>
           </a:ln>
           <a:effectLst/>
-          <a:extLst>
-            <a:ext uri="{909E8E84-426E-40DD-AFC4-6F175D3DCCD1}">
-              <a14:hiddenFill xmlns:a14="http://schemas.microsoft.com/office/drawing/2010/main">
-                <a:solidFill>
-                  <a:schemeClr val="accent1"/>
-                </a:solidFill>
-              </a14:hiddenFill>
-            </a:ext>
-            <a:ext uri="{91240B29-F687-4F45-9708-019B960494DF}">
-              <a14:hiddenLine xmlns:a14="http://schemas.microsoft.com/office/drawing/2010/main" w="9525">
-                <a:solidFill>
-                  <a:schemeClr val="tx1"/>
-                </a:solidFill>
-                <a:miter lim="800000"/>
-                <a:headEnd/>
-                <a:tailEnd/>
-              </a14:hiddenLine>
-            </a:ext>
-            <a:ext uri="{AF507438-7753-43E0-B8FC-AC1667EBCBE1}">
-              <a14:hiddenEffects xmlns:a14="http://schemas.microsoft.com/office/drawing/2010/main">
-                <a:effectLst>
-                  <a:outerShdw dist="35921" dir="2700000" algn="ctr" rotWithShape="0">
-                    <a:schemeClr val="bg2"/>
-                  </a:outerShdw>
-                </a:effectLst>
-              </a14:hiddenEffects>
-            </a:ext>
-          </a:extLst>
         </p:spPr>
         <p:txBody>
           <a:bodyPr vert="horz" wrap="square" lIns="91440" tIns="45720" rIns="91440" bIns="45720" numCol="1" anchor="b" anchorCtr="0" compatLnSpc="1">
@@ -916,29 +671,37 @@
           </a:bodyPr>
           <a:lstStyle>
             <a:lvl1pPr algn="r">
-              <a:defRPr sz="1200"/>
+              <a:defRPr sz="1200">
+                <a:latin typeface="Arial" charset="0"/>
+              </a:defRPr>
             </a:lvl1pPr>
           </a:lstStyle>
           <a:p>
-            <a:fld id="{74ACB795-123D-4B41-ABB8-5412373C4490}" type="slidenum">
-              <a:rPr lang="en-GB"/>
-              <a:pPr/>
+            <a:pPr>
+              <a:defRPr/>
+            </a:pPr>
+            <a:fld id="{32BDCDAC-DE62-4AD3-97B8-72AB65504827}" type="slidenum">
+              <a:rPr lang="de-DE"/>
+              <a:pPr>
+                <a:defRPr/>
+              </a:pPr>
               <a:t>‹Nr.›</a:t>
             </a:fld>
-            <a:endParaRPr lang="en-GB"/>
+            <a:endParaRPr lang="de-DE"/>
           </a:p>
         </p:txBody>
       </p:sp>
     </p:spTree>
     <p:extLst>
       <p:ext uri="{BB962C8B-B14F-4D97-AF65-F5344CB8AC3E}">
-        <p14:creationId xmlns:p14="http://schemas.microsoft.com/office/powerpoint/2010/main" val="2532885161"/>
+        <p14:creationId xmlns:p14="http://schemas.microsoft.com/office/powerpoint/2010/main" val="304638418"/>
       </p:ext>
     </p:extLst>
   </p:cSld>
   <p:clrMap bg1="lt1" tx1="dk1" bg2="lt2" tx2="dk2" accent1="accent1" accent2="accent2" accent3="accent3" accent4="accent4" accent5="accent5" accent6="accent6" hlink="hlink" folHlink="folHlink"/>
+  <p:hf hdr="0" dt="0"/>
   <p:notesStyle>
-    <a:lvl1pPr algn="l" rtl="0" fontAlgn="base">
+    <a:lvl1pPr algn="l" rtl="0" eaLnBrk="0" fontAlgn="base" hangingPunct="0">
       <a:spcBef>
         <a:spcPct val="30000"/>
       </a:spcBef>
@@ -954,7 +717,7 @@
         <a:cs typeface="+mn-cs"/>
       </a:defRPr>
     </a:lvl1pPr>
-    <a:lvl2pPr marL="457200" algn="l" rtl="0" fontAlgn="base">
+    <a:lvl2pPr marL="457200" algn="l" rtl="0" eaLnBrk="0" fontAlgn="base" hangingPunct="0">
       <a:spcBef>
         <a:spcPct val="30000"/>
       </a:spcBef>
@@ -970,7 +733,7 @@
         <a:cs typeface="+mn-cs"/>
       </a:defRPr>
     </a:lvl2pPr>
-    <a:lvl3pPr marL="914400" algn="l" rtl="0" fontAlgn="base">
+    <a:lvl3pPr marL="914400" algn="l" rtl="0" eaLnBrk="0" fontAlgn="base" hangingPunct="0">
       <a:spcBef>
         <a:spcPct val="30000"/>
       </a:spcBef>
@@ -986,7 +749,7 @@
         <a:cs typeface="+mn-cs"/>
       </a:defRPr>
     </a:lvl3pPr>
-    <a:lvl4pPr marL="1371600" algn="l" rtl="0" fontAlgn="base">
+    <a:lvl4pPr marL="1371600" algn="l" rtl="0" eaLnBrk="0" fontAlgn="base" hangingPunct="0">
       <a:spcBef>
         <a:spcPct val="30000"/>
       </a:spcBef>
@@ -1002,7 +765,7 @@
         <a:cs typeface="+mn-cs"/>
       </a:defRPr>
     </a:lvl4pPr>
-    <a:lvl5pPr marL="1828800" algn="l" rtl="0" fontAlgn="base">
+    <a:lvl5pPr marL="1828800" algn="l" rtl="0" eaLnBrk="0" fontAlgn="base" hangingPunct="0">
       <a:spcBef>
         <a:spcPct val="30000"/>
       </a:spcBef>
@@ -1110,263 +873,11 @@
           <a:p>
             <a:r>
               <a:rPr lang="en-GB" dirty="0" smtClean="0"/>
-              <a:t>Die </a:t>
-            </a:r>
-            <a:r>
-              <a:rPr lang="en-GB" dirty="0" err="1" smtClean="0"/>
-              <a:t>angegebene</a:t>
+              <a:t>The</a:t>
             </a:r>
             <a:r>
               <a:rPr lang="en-GB" baseline="0" dirty="0" smtClean="0"/>
-              <a:t> </a:t>
-            </a:r>
-            <a:r>
-              <a:rPr lang="en-GB" baseline="0" dirty="0" err="1" smtClean="0"/>
-              <a:t>Gliederung</a:t>
-            </a:r>
-            <a:r>
-              <a:rPr lang="en-GB" baseline="0" dirty="0" smtClean="0"/>
-              <a:t> </a:t>
-            </a:r>
-            <a:r>
-              <a:rPr lang="en-GB" baseline="0" dirty="0" err="1" smtClean="0"/>
-              <a:t>ist</a:t>
-            </a:r>
-            <a:r>
-              <a:rPr lang="en-GB" baseline="0" dirty="0" smtClean="0"/>
-              <a:t> </a:t>
-            </a:r>
-            <a:r>
-              <a:rPr lang="en-GB" baseline="0" dirty="0" err="1" smtClean="0"/>
-              <a:t>nur</a:t>
-            </a:r>
-            <a:r>
-              <a:rPr lang="en-GB" baseline="0" dirty="0" smtClean="0"/>
-              <a:t> </a:t>
-            </a:r>
-            <a:r>
-              <a:rPr lang="en-GB" baseline="0" dirty="0" err="1" smtClean="0"/>
-              <a:t>ein</a:t>
-            </a:r>
-            <a:r>
-              <a:rPr lang="en-GB" baseline="0" dirty="0" smtClean="0"/>
-              <a:t> </a:t>
-            </a:r>
-            <a:r>
-              <a:rPr lang="en-GB" baseline="0" dirty="0" err="1" smtClean="0"/>
-              <a:t>Beispiel</a:t>
-            </a:r>
-            <a:r>
-              <a:rPr lang="en-GB" baseline="0" dirty="0" smtClean="0"/>
-              <a:t>, </a:t>
-            </a:r>
-            <a:r>
-              <a:rPr lang="en-GB" baseline="0" dirty="0" err="1" smtClean="0"/>
-              <a:t>sie</a:t>
-            </a:r>
-            <a:r>
-              <a:rPr lang="en-GB" baseline="0" dirty="0" smtClean="0"/>
-              <a:t> muss an die </a:t>
-            </a:r>
-            <a:r>
-              <a:rPr lang="en-GB" baseline="0" dirty="0" err="1" smtClean="0"/>
-              <a:t>Folien</a:t>
-            </a:r>
-            <a:r>
-              <a:rPr lang="en-GB" baseline="0" dirty="0" smtClean="0"/>
-              <a:t> </a:t>
-            </a:r>
-            <a:r>
-              <a:rPr lang="en-GB" baseline="0" dirty="0" err="1" smtClean="0"/>
-              <a:t>angepasst</a:t>
-            </a:r>
-            <a:r>
-              <a:rPr lang="en-GB" baseline="0" dirty="0" smtClean="0"/>
-              <a:t> </a:t>
-            </a:r>
-            <a:r>
-              <a:rPr lang="en-GB" baseline="0" dirty="0" err="1" smtClean="0"/>
-              <a:t>werden</a:t>
-            </a:r>
-            <a:r>
-              <a:rPr lang="en-GB" baseline="0" dirty="0" smtClean="0"/>
-              <a:t> (s. https://sdqweb.ipd.kit.edu/wiki/Vortragshinweise) und </a:t>
-            </a:r>
-            <a:r>
-              <a:rPr lang="en-GB" baseline="0" dirty="0" err="1" smtClean="0"/>
-              <a:t>manuell</a:t>
-            </a:r>
-            <a:r>
-              <a:rPr lang="en-GB" baseline="0" dirty="0" smtClean="0"/>
-              <a:t> auf </a:t>
-            </a:r>
-            <a:r>
-              <a:rPr lang="en-GB" baseline="0" dirty="0" err="1" smtClean="0"/>
-              <a:t>jede</a:t>
-            </a:r>
-            <a:r>
-              <a:rPr lang="en-GB" baseline="0" dirty="0" smtClean="0"/>
-              <a:t> </a:t>
-            </a:r>
-            <a:r>
-              <a:rPr lang="en-GB" baseline="0" dirty="0" err="1" smtClean="0"/>
-              <a:t>Folie</a:t>
-            </a:r>
-            <a:r>
-              <a:rPr lang="en-GB" baseline="0" dirty="0" smtClean="0"/>
-              <a:t> </a:t>
-            </a:r>
-            <a:r>
-              <a:rPr lang="en-GB" baseline="0" dirty="0" err="1" smtClean="0"/>
-              <a:t>kopiert</a:t>
-            </a:r>
-            <a:r>
-              <a:rPr lang="en-GB" baseline="0" dirty="0" smtClean="0"/>
-              <a:t> </a:t>
-            </a:r>
-            <a:r>
-              <a:rPr lang="en-GB" baseline="0" dirty="0" err="1" smtClean="0"/>
-              <a:t>werden</a:t>
-            </a:r>
-            <a:r>
-              <a:rPr lang="en-GB" baseline="0" dirty="0" smtClean="0"/>
-              <a:t>. Das </a:t>
-            </a:r>
-            <a:r>
-              <a:rPr lang="en-GB" baseline="0" dirty="0" err="1" smtClean="0"/>
-              <a:t>aktuelle</a:t>
-            </a:r>
-            <a:r>
-              <a:rPr lang="en-GB" baseline="0" dirty="0" smtClean="0"/>
-              <a:t> </a:t>
-            </a:r>
-            <a:r>
-              <a:rPr lang="en-GB" baseline="0" dirty="0" err="1" smtClean="0"/>
-              <a:t>Kapitel</a:t>
-            </a:r>
-            <a:r>
-              <a:rPr lang="en-GB" baseline="0" dirty="0" smtClean="0"/>
-              <a:t> </a:t>
-            </a:r>
-            <a:r>
-              <a:rPr lang="en-GB" baseline="0" dirty="0" err="1" smtClean="0"/>
-              <a:t>sollte</a:t>
-            </a:r>
-            <a:r>
-              <a:rPr lang="en-GB" baseline="0" dirty="0" smtClean="0"/>
-              <a:t> </a:t>
-            </a:r>
-            <a:r>
-              <a:rPr lang="en-GB" baseline="0" dirty="0" err="1" smtClean="0"/>
-              <a:t>fettgedruckt</a:t>
-            </a:r>
-            <a:r>
-              <a:rPr lang="en-GB" baseline="0" dirty="0" smtClean="0"/>
-              <a:t> </a:t>
-            </a:r>
-            <a:r>
-              <a:rPr lang="en-GB" baseline="0" dirty="0" err="1" smtClean="0"/>
-              <a:t>werden</a:t>
-            </a:r>
-            <a:r>
-              <a:rPr lang="en-GB" baseline="0" dirty="0" smtClean="0"/>
-              <a:t>. Den </a:t>
-            </a:r>
-            <a:r>
-              <a:rPr lang="en-GB" baseline="0" dirty="0" err="1" smtClean="0"/>
-              <a:t>Abstand</a:t>
-            </a:r>
-            <a:r>
-              <a:rPr lang="en-GB" baseline="0" dirty="0" smtClean="0"/>
-              <a:t> </a:t>
-            </a:r>
-            <a:r>
-              <a:rPr lang="en-GB" baseline="0" dirty="0" err="1" smtClean="0"/>
-              <a:t>der</a:t>
-            </a:r>
-            <a:r>
-              <a:rPr lang="en-GB" baseline="0" dirty="0" smtClean="0"/>
-              <a:t> </a:t>
-            </a:r>
-            <a:r>
-              <a:rPr lang="en-GB" baseline="0" dirty="0" err="1" smtClean="0"/>
-              <a:t>Worte</a:t>
-            </a:r>
-            <a:r>
-              <a:rPr lang="en-GB" baseline="0" dirty="0" smtClean="0"/>
-              <a:t> </a:t>
-            </a:r>
-            <a:r>
-              <a:rPr lang="en-GB" baseline="0" dirty="0" err="1" smtClean="0"/>
-              <a:t>kann</a:t>
-            </a:r>
-            <a:r>
-              <a:rPr lang="en-GB" baseline="0" dirty="0" smtClean="0"/>
-              <a:t> man gut in PowerPoint an </a:t>
-            </a:r>
-            <a:r>
-              <a:rPr lang="en-GB" baseline="0" dirty="0" err="1" smtClean="0"/>
-              <a:t>andere</a:t>
-            </a:r>
-            <a:r>
-              <a:rPr lang="en-GB" baseline="0" dirty="0" smtClean="0"/>
-              <a:t> </a:t>
-            </a:r>
-            <a:r>
-              <a:rPr lang="en-GB" baseline="0" dirty="0" err="1" smtClean="0"/>
-              <a:t>Wortlängen</a:t>
-            </a:r>
-            <a:r>
-              <a:rPr lang="en-GB" baseline="0" dirty="0" smtClean="0"/>
-              <a:t> </a:t>
-            </a:r>
-            <a:r>
-              <a:rPr lang="en-GB" baseline="0" dirty="0" err="1" smtClean="0"/>
-              <a:t>anpassen</a:t>
-            </a:r>
-            <a:r>
-              <a:rPr lang="en-GB" baseline="0" dirty="0" smtClean="0"/>
-              <a:t>, </a:t>
-            </a:r>
-            <a:r>
-              <a:rPr lang="en-GB" baseline="0" dirty="0" err="1" smtClean="0"/>
-              <a:t>dazu</a:t>
-            </a:r>
-            <a:r>
-              <a:rPr lang="en-GB" baseline="0" dirty="0" smtClean="0"/>
-              <a:t> </a:t>
-            </a:r>
-            <a:r>
-              <a:rPr lang="en-GB" baseline="0" dirty="0" err="1" smtClean="0"/>
-              <a:t>alle</a:t>
-            </a:r>
-            <a:r>
-              <a:rPr lang="en-GB" baseline="0" dirty="0" smtClean="0"/>
-              <a:t> </a:t>
-            </a:r>
-            <a:r>
-              <a:rPr lang="en-GB" baseline="0" dirty="0" err="1" smtClean="0"/>
-              <a:t>Worte</a:t>
-            </a:r>
-            <a:r>
-              <a:rPr lang="en-GB" baseline="0" dirty="0" smtClean="0"/>
-              <a:t> und die </a:t>
-            </a:r>
-            <a:r>
-              <a:rPr lang="en-GB" baseline="0" dirty="0" err="1" smtClean="0"/>
-              <a:t>Pfeile</a:t>
-            </a:r>
-            <a:r>
-              <a:rPr lang="en-GB" baseline="0" dirty="0" smtClean="0"/>
-              <a:t> </a:t>
-            </a:r>
-            <a:r>
-              <a:rPr lang="en-GB" baseline="0" dirty="0" err="1" smtClean="0"/>
-              <a:t>markieren</a:t>
-            </a:r>
-            <a:r>
-              <a:rPr lang="en-GB" baseline="0" dirty="0" smtClean="0"/>
-              <a:t> und “</a:t>
+              <a:t> outline is just an and has to be adjusted example (see https://sdqweb.ipd.kit.edu/wiki/Vortragshinweise)  and copied to each slide manually. The current chapter should be in bold font. The distance of the words can be adjusted automatically by PowerPoint: select all words and arrows  and then select “</a:t>
             </a:r>
             <a:r>
               <a:rPr lang="en-GB" baseline="0" dirty="0" err="1" smtClean="0"/>
@@ -1389,16 +900,12 @@
               <a:t>verteilen</a:t>
             </a:r>
             <a:r>
+              <a:rPr lang="en-GB" baseline="0" smtClean="0"/>
+              <a:t>” (</a:t>
+            </a:r>
+            <a:r>
               <a:rPr lang="en-GB" baseline="0" dirty="0" smtClean="0"/>
-              <a:t>”  </a:t>
-            </a:r>
-            <a:r>
-              <a:rPr lang="en-GB" baseline="0" dirty="0" err="1" smtClean="0"/>
-              <a:t>auswählen</a:t>
-            </a:r>
-            <a:r>
-              <a:rPr lang="en-GB" baseline="0" dirty="0" smtClean="0"/>
-              <a:t> (PowerPoint2007). </a:t>
+              <a:t>PowerPoint2007). </a:t>
             </a:r>
             <a:endParaRPr lang="en-GB" dirty="0"/>
           </a:p>
@@ -1406,12 +913,12 @@
       </p:sp>
       <p:sp>
         <p:nvSpPr>
-          <p:cNvPr id="4" name="Foliennummernplatzhalter 3"/>
+          <p:cNvPr id="4" name="Fußzeilenplatzhalter 3"/>
           <p:cNvSpPr>
             <a:spLocks noGrp="1"/>
           </p:cNvSpPr>
           <p:nvPr>
-            <p:ph type="sldNum" sz="quarter" idx="10"/>
+            <p:ph type="ftr" sz="quarter" idx="10"/>
           </p:nvPr>
         </p:nvSpPr>
         <p:spPr/>
@@ -1419,16 +926,338 @@
           <a:bodyPr/>
           <a:lstStyle/>
           <a:p>
-            <a:fld id="{74ACB795-123D-4B41-ABB8-5412373C4490}" type="slidenum">
-              <a:rPr lang="en-GB" smtClean="0"/>
-              <a:pPr/>
+            <a:pPr>
+              <a:defRPr/>
+            </a:pPr>
+            <a:r>
+              <a:rPr lang="de-DE" smtClean="0"/>
+              <a:t>Prof. Dr. Max Mustermann | </a:t>
+            </a:r>
+            <a:br>
+              <a:rPr lang="de-DE" smtClean="0"/>
+            </a:br>
+            <a:r>
+              <a:rPr lang="de-DE" smtClean="0"/>
+              <a:t>Name of Faculty</a:t>
+            </a:r>
+            <a:endParaRPr lang="de-DE"/>
+          </a:p>
+        </p:txBody>
+      </p:sp>
+      <p:sp>
+        <p:nvSpPr>
+          <p:cNvPr id="5" name="Foliennummernplatzhalter 4"/>
+          <p:cNvSpPr>
+            <a:spLocks noGrp="1"/>
+          </p:cNvSpPr>
+          <p:nvPr>
+            <p:ph type="sldNum" sz="quarter" idx="11"/>
+          </p:nvPr>
+        </p:nvSpPr>
+        <p:spPr/>
+        <p:txBody>
+          <a:bodyPr/>
+          <a:lstStyle/>
+          <a:p>
+            <a:pPr>
+              <a:defRPr/>
+            </a:pPr>
+            <a:fld id="{32BDCDAC-DE62-4AD3-97B8-72AB65504827}" type="slidenum">
+              <a:rPr lang="de-DE" smtClean="0"/>
+              <a:pPr>
+                <a:defRPr/>
+              </a:pPr>
               <a:t>2</a:t>
             </a:fld>
-            <a:endParaRPr lang="en-GB"/>
+            <a:endParaRPr lang="de-DE"/>
           </a:p>
         </p:txBody>
       </p:sp>
     </p:spTree>
+  </p:cSld>
+  <p:clrMapOvr>
+    <a:masterClrMapping/>
+  </p:clrMapOvr>
+</p:notes>
+</file>
+
+<file path=ppt/notesSlides/notesSlide2.xml><?xml version="1.0" encoding="utf-8"?>
+<p:notes xmlns:a="http://schemas.openxmlformats.org/drawingml/2006/main" xmlns:r="http://schemas.openxmlformats.org/officeDocument/2006/relationships" xmlns:p="http://schemas.openxmlformats.org/presentationml/2006/main">
+  <p:cSld>
+    <p:spTree>
+      <p:nvGrpSpPr>
+        <p:cNvPr id="1" name=""/>
+        <p:cNvGrpSpPr/>
+        <p:nvPr/>
+      </p:nvGrpSpPr>
+      <p:grpSpPr>
+        <a:xfrm>
+          <a:off x="0" y="0"/>
+          <a:ext cx="0" cy="0"/>
+          <a:chOff x="0" y="0"/>
+          <a:chExt cx="0" cy="0"/>
+        </a:xfrm>
+      </p:grpSpPr>
+      <p:sp>
+        <p:nvSpPr>
+          <p:cNvPr id="2" name="Folienbildplatzhalter 1"/>
+          <p:cNvSpPr>
+            <a:spLocks noGrp="1" noRot="1" noChangeAspect="1"/>
+          </p:cNvSpPr>
+          <p:nvPr>
+            <p:ph type="sldImg"/>
+          </p:nvPr>
+        </p:nvSpPr>
+        <p:spPr/>
+      </p:sp>
+      <p:sp>
+        <p:nvSpPr>
+          <p:cNvPr id="3" name="Notizenplatzhalter 2"/>
+          <p:cNvSpPr>
+            <a:spLocks noGrp="1"/>
+          </p:cNvSpPr>
+          <p:nvPr>
+            <p:ph type="body" idx="1"/>
+          </p:nvPr>
+        </p:nvSpPr>
+        <p:spPr/>
+        <p:txBody>
+          <a:bodyPr>
+            <a:normAutofit/>
+          </a:bodyPr>
+          <a:lstStyle/>
+          <a:p>
+            <a:r>
+              <a:rPr lang="en-GB" dirty="0" smtClean="0"/>
+              <a:t>The</a:t>
+            </a:r>
+            <a:r>
+              <a:rPr lang="en-GB" baseline="0" dirty="0" smtClean="0"/>
+              <a:t> outline is just an and has to be adjusted example (see https://sdqweb.ipd.kit.edu/wiki/Vortragshinweise)  and copied to each slide manually. The current chapter should be in bold font. The distance of the words can be adjusted automatically by PowerPoint: select all words and arrows  and then select “</a:t>
+            </a:r>
+            <a:r>
+              <a:rPr lang="en-GB" baseline="0" dirty="0" err="1" smtClean="0"/>
+              <a:t>Anordnen</a:t>
+            </a:r>
+            <a:r>
+              <a:rPr lang="en-GB" baseline="0" dirty="0" smtClean="0"/>
+              <a:t> -&gt; </a:t>
+            </a:r>
+            <a:r>
+              <a:rPr lang="en-GB" baseline="0" dirty="0" err="1" smtClean="0"/>
+              <a:t>Ausrichten</a:t>
+            </a:r>
+            <a:r>
+              <a:rPr lang="en-GB" baseline="0" dirty="0" smtClean="0"/>
+              <a:t> -&gt; Horizontal </a:t>
+            </a:r>
+            <a:r>
+              <a:rPr lang="en-GB" baseline="0" dirty="0" err="1" smtClean="0"/>
+              <a:t>verteilen</a:t>
+            </a:r>
+            <a:r>
+              <a:rPr lang="en-GB" baseline="0" smtClean="0"/>
+              <a:t>” (</a:t>
+            </a:r>
+            <a:r>
+              <a:rPr lang="en-GB" baseline="0" dirty="0" smtClean="0"/>
+              <a:t>PowerPoint2007). </a:t>
+            </a:r>
+            <a:endParaRPr lang="en-GB" dirty="0"/>
+          </a:p>
+        </p:txBody>
+      </p:sp>
+      <p:sp>
+        <p:nvSpPr>
+          <p:cNvPr id="4" name="Fußzeilenplatzhalter 3"/>
+          <p:cNvSpPr>
+            <a:spLocks noGrp="1"/>
+          </p:cNvSpPr>
+          <p:nvPr>
+            <p:ph type="ftr" sz="quarter" idx="10"/>
+          </p:nvPr>
+        </p:nvSpPr>
+        <p:spPr/>
+        <p:txBody>
+          <a:bodyPr/>
+          <a:lstStyle/>
+          <a:p>
+            <a:pPr>
+              <a:defRPr/>
+            </a:pPr>
+            <a:r>
+              <a:rPr lang="de-DE" smtClean="0"/>
+              <a:t>Prof. Dr. Max Mustermann | </a:t>
+            </a:r>
+            <a:br>
+              <a:rPr lang="de-DE" smtClean="0"/>
+            </a:br>
+            <a:r>
+              <a:rPr lang="de-DE" smtClean="0"/>
+              <a:t>Name of Faculty</a:t>
+            </a:r>
+            <a:endParaRPr lang="de-DE"/>
+          </a:p>
+        </p:txBody>
+      </p:sp>
+      <p:sp>
+        <p:nvSpPr>
+          <p:cNvPr id="5" name="Foliennummernplatzhalter 4"/>
+          <p:cNvSpPr>
+            <a:spLocks noGrp="1"/>
+          </p:cNvSpPr>
+          <p:nvPr>
+            <p:ph type="sldNum" sz="quarter" idx="11"/>
+          </p:nvPr>
+        </p:nvSpPr>
+        <p:spPr/>
+        <p:txBody>
+          <a:bodyPr/>
+          <a:lstStyle/>
+          <a:p>
+            <a:pPr>
+              <a:defRPr/>
+            </a:pPr>
+            <a:fld id="{32BDCDAC-DE62-4AD3-97B8-72AB65504827}" type="slidenum">
+              <a:rPr lang="de-DE" smtClean="0"/>
+              <a:pPr>
+                <a:defRPr/>
+              </a:pPr>
+              <a:t>3</a:t>
+            </a:fld>
+            <a:endParaRPr lang="de-DE"/>
+          </a:p>
+        </p:txBody>
+      </p:sp>
+    </p:spTree>
+    <p:extLst>
+      <p:ext uri="{BB962C8B-B14F-4D97-AF65-F5344CB8AC3E}">
+        <p14:creationId xmlns:p14="http://schemas.microsoft.com/office/powerpoint/2010/main" val="3549135245"/>
+      </p:ext>
+    </p:extLst>
+  </p:cSld>
+  <p:clrMapOvr>
+    <a:masterClrMapping/>
+  </p:clrMapOvr>
+</p:notes>
+</file>
+
+<file path=ppt/notesSlides/notesSlide3.xml><?xml version="1.0" encoding="utf-8"?>
+<p:notes xmlns:a="http://schemas.openxmlformats.org/drawingml/2006/main" xmlns:r="http://schemas.openxmlformats.org/officeDocument/2006/relationships" xmlns:p="http://schemas.openxmlformats.org/presentationml/2006/main">
+  <p:cSld>
+    <p:spTree>
+      <p:nvGrpSpPr>
+        <p:cNvPr id="1" name=""/>
+        <p:cNvGrpSpPr/>
+        <p:nvPr/>
+      </p:nvGrpSpPr>
+      <p:grpSpPr>
+        <a:xfrm>
+          <a:off x="0" y="0"/>
+          <a:ext cx="0" cy="0"/>
+          <a:chOff x="0" y="0"/>
+          <a:chExt cx="0" cy="0"/>
+        </a:xfrm>
+      </p:grpSpPr>
+      <p:sp>
+        <p:nvSpPr>
+          <p:cNvPr id="2" name="Folienbildplatzhalter 1"/>
+          <p:cNvSpPr>
+            <a:spLocks noGrp="1" noRot="1" noChangeAspect="1"/>
+          </p:cNvSpPr>
+          <p:nvPr>
+            <p:ph type="sldImg"/>
+          </p:nvPr>
+        </p:nvSpPr>
+        <p:spPr/>
+      </p:sp>
+      <p:sp>
+        <p:nvSpPr>
+          <p:cNvPr id="3" name="Notizenplatzhalter 2"/>
+          <p:cNvSpPr>
+            <a:spLocks noGrp="1"/>
+          </p:cNvSpPr>
+          <p:nvPr>
+            <p:ph type="body" idx="1"/>
+          </p:nvPr>
+        </p:nvSpPr>
+        <p:spPr/>
+        <p:txBody>
+          <a:bodyPr/>
+          <a:lstStyle/>
+          <a:p>
+            <a:endParaRPr lang="de-DE"/>
+          </a:p>
+        </p:txBody>
+      </p:sp>
+      <p:sp>
+        <p:nvSpPr>
+          <p:cNvPr id="4" name="Fußzeilenplatzhalter 3"/>
+          <p:cNvSpPr>
+            <a:spLocks noGrp="1"/>
+          </p:cNvSpPr>
+          <p:nvPr>
+            <p:ph type="ftr" sz="quarter" idx="10"/>
+          </p:nvPr>
+        </p:nvSpPr>
+        <p:spPr/>
+        <p:txBody>
+          <a:bodyPr/>
+          <a:lstStyle/>
+          <a:p>
+            <a:pPr>
+              <a:defRPr/>
+            </a:pPr>
+            <a:r>
+              <a:rPr lang="de-DE" smtClean="0"/>
+              <a:t>Prof. Dr. Max Mustermann | </a:t>
+            </a:r>
+            <a:br>
+              <a:rPr lang="de-DE" smtClean="0"/>
+            </a:br>
+            <a:r>
+              <a:rPr lang="de-DE" smtClean="0"/>
+              <a:t>Name of Faculty</a:t>
+            </a:r>
+            <a:endParaRPr lang="de-DE"/>
+          </a:p>
+        </p:txBody>
+      </p:sp>
+      <p:sp>
+        <p:nvSpPr>
+          <p:cNvPr id="5" name="Foliennummernplatzhalter 4"/>
+          <p:cNvSpPr>
+            <a:spLocks noGrp="1"/>
+          </p:cNvSpPr>
+          <p:nvPr>
+            <p:ph type="sldNum" sz="quarter" idx="11"/>
+          </p:nvPr>
+        </p:nvSpPr>
+        <p:spPr/>
+        <p:txBody>
+          <a:bodyPr/>
+          <a:lstStyle/>
+          <a:p>
+            <a:pPr>
+              <a:defRPr/>
+            </a:pPr>
+            <a:fld id="{32BDCDAC-DE62-4AD3-97B8-72AB65504827}" type="slidenum">
+              <a:rPr lang="de-DE" smtClean="0"/>
+              <a:pPr>
+                <a:defRPr/>
+              </a:pPr>
+              <a:t>4</a:t>
+            </a:fld>
+            <a:endParaRPr lang="de-DE"/>
+          </a:p>
+        </p:txBody>
+      </p:sp>
+    </p:spTree>
+    <p:extLst>
+      <p:ext uri="{BB962C8B-B14F-4D97-AF65-F5344CB8AC3E}">
+        <p14:creationId xmlns:p14="http://schemas.microsoft.com/office/powerpoint/2010/main" val="1534601311"/>
+      </p:ext>
+    </p:extLst>
   </p:cSld>
   <p:clrMapOvr>
     <a:masterClrMapping/>
@@ -1462,19 +1291,21 @@
           <p:nvPr/>
         </p:nvPicPr>
         <p:blipFill>
-          <a:blip r:embed="rId2" cstate="print">
-            <a:lum bright="14000" contrast="-4000"/>
-            <a:grayscl/>
+          <a:blip r:embed="rId2">
+            <a:extLst>
+              <a:ext uri="{28A0092B-C50C-407E-A947-70E740481C1C}">
+                <a14:useLocalDpi xmlns:a14="http://schemas.microsoft.com/office/drawing/2010/main" val="0"/>
+              </a:ext>
+            </a:extLst>
           </a:blip>
-          <a:srcRect t="20958" b="21313"/>
           <a:stretch>
             <a:fillRect/>
           </a:stretch>
         </p:blipFill>
         <p:spPr bwMode="auto">
           <a:xfrm>
-            <a:off x="87313" y="3479800"/>
-            <a:ext cx="9056687" cy="2924175"/>
+            <a:off x="56928" y="3070561"/>
+            <a:ext cx="8988647" cy="3312922"/>
           </a:xfrm>
           <a:prstGeom prst="rect">
             <a:avLst/>
@@ -1505,7 +1336,7 @@
         </p:blipFill>
         <p:spPr bwMode="auto">
           <a:xfrm>
-            <a:off x="-2557462" y="-838200"/>
+            <a:off x="0" y="-12700"/>
             <a:ext cx="9144000" cy="6870700"/>
           </a:xfrm>
           <a:prstGeom prst="rect">
@@ -1558,24 +1389,24 @@
               <a:rPr lang="en-US" sz="1000" dirty="0">
                 <a:latin typeface="Arial" pitchFamily="34" charset="0"/>
               </a:rPr>
-              <a:t>KIT – </a:t>
-            </a:r>
-            <a:r>
-              <a:rPr lang="de-DE" sz="1000" dirty="0" smtClean="0">
-                <a:latin typeface="Arial" pitchFamily="34" charset="0"/>
-              </a:rPr>
-              <a:t>Universität des Landes Baden-Württemberg und </a:t>
+              <a:t>KIT – University of the State of Baden-Wuerttemberg and </a:t>
             </a:r>
             <a:br>
-              <a:rPr lang="de-DE" sz="1000" dirty="0" smtClean="0">
+              <a:rPr lang="en-US" sz="1000" dirty="0">
                 <a:latin typeface="Arial" pitchFamily="34" charset="0"/>
               </a:rPr>
             </a:br>
             <a:r>
-              <a:rPr lang="de-DE" sz="1000" dirty="0" smtClean="0">
+              <a:rPr lang="en-US" sz="1000" dirty="0">
                 <a:latin typeface="Arial" pitchFamily="34" charset="0"/>
               </a:rPr>
-              <a:t>nationales Forschungszentrum in der Helmholtz-Gemeinschaft</a:t>
+              <a:t>National Research Center of the Helmholtz Association</a:t>
+            </a:r>
+            <a:r>
+              <a:rPr lang="de-DE" sz="1000" dirty="0">
+                <a:latin typeface="Arial" pitchFamily="34" charset="0"/>
+              </a:rPr>
+              <a:t> </a:t>
             </a:r>
             <a:endParaRPr lang="en-US" sz="1000" dirty="0">
               <a:latin typeface="Arial" pitchFamily="34" charset="0"/>
@@ -1630,20 +1461,14 @@
       </p:sp>
       <p:pic>
         <p:nvPicPr>
-          <p:cNvPr id="8" name="Picture 2" descr="C:\versioned\KlausSVN\Dissertation\presentations\Disputation\kit_logo_de_farbe_positiv.jpg"/>
+          <p:cNvPr id="7" name="Picture 13" descr="KIT-Logo-rgb_en"/>
           <p:cNvPicPr>
             <a:picLocks noChangeAspect="1" noChangeArrowheads="1"/>
           </p:cNvPicPr>
-          <p:nvPr userDrawn="1"/>
+          <p:nvPr/>
         </p:nvPicPr>
         <p:blipFill>
-          <a:blip r:embed="rId4" cstate="print">
-            <a:extLst>
-              <a:ext uri="{28A0092B-C50C-407E-A947-70E740481C1C}">
-                <a14:useLocalDpi xmlns:a14="http://schemas.microsoft.com/office/drawing/2010/main" val="0"/>
-              </a:ext>
-            </a:extLst>
-          </a:blip>
+          <a:blip r:embed="rId4" cstate="print"/>
           <a:srcRect/>
           <a:stretch>
             <a:fillRect/>
@@ -1651,22 +1476,19 @@
         </p:blipFill>
         <p:spPr bwMode="auto">
           <a:xfrm>
-            <a:off x="396874" y="333375"/>
-            <a:ext cx="1617664" cy="739736"/>
+            <a:off x="395288" y="333375"/>
+            <a:ext cx="1619250" cy="747713"/>
           </a:xfrm>
           <a:prstGeom prst="rect">
             <a:avLst/>
           </a:prstGeom>
           <a:noFill/>
-          <a:extLst>
-            <a:ext uri="{909E8E84-426E-40DD-AFC4-6F175D3DCCD1}">
-              <a14:hiddenFill xmlns:a14="http://schemas.microsoft.com/office/drawing/2010/main">
-                <a:solidFill>
-                  <a:srgbClr val="FFFFFF"/>
-                </a:solidFill>
-              </a14:hiddenFill>
-            </a:ext>
-          </a:extLst>
+          <a:ln w="9525">
+            <a:noFill/>
+            <a:miter lim="800000"/>
+            <a:headEnd/>
+            <a:tailEnd/>
+          </a:ln>
         </p:spPr>
       </p:pic>
     </p:spTree>
@@ -1735,7 +1557,7 @@
             <a:pPr lvl="0"/>
             <a:r>
               <a:rPr lang="de-DE" smtClean="0"/>
-              <a:t>Textmasterformat bearbeiten</a:t>
+              <a:t>Textmasterformate durch Klicken bearbeiten</a:t>
             </a:r>
           </a:p>
           <a:p>
@@ -1790,11 +1612,14 @@
             </a:lvl1pPr>
           </a:lstStyle>
           <a:p>
-            <a:r>
-              <a:rPr lang="de-DE" smtClean="0"/>
-              <a:t>Name Vorname: Titel des Vortrags</a:t>
-            </a:r>
-            <a:endParaRPr lang="de-DE"/>
+            <a:pPr>
+              <a:defRPr/>
+            </a:pPr>
+            <a:r>
+              <a:rPr lang="de-DE" smtClean="0"/>
+              <a:t>Surname Lastname - Presentation Title</a:t>
+            </a:r>
+            <a:endParaRPr lang="en-US"/>
           </a:p>
         </p:txBody>
       </p:sp>
@@ -1874,7 +1699,7 @@
             <a:pPr lvl="0"/>
             <a:r>
               <a:rPr lang="de-DE" smtClean="0"/>
-              <a:t>Textmasterformat bearbeiten</a:t>
+              <a:t>Textmasterformate durch Klicken bearbeiten</a:t>
             </a:r>
           </a:p>
           <a:p>
@@ -1929,121 +1754,14 @@
             </a:lvl1pPr>
           </a:lstStyle>
           <a:p>
-            <a:r>
-              <a:rPr lang="de-DE" smtClean="0"/>
-              <a:t>Name Vorname: Titel des Vortrags</a:t>
-            </a:r>
-            <a:endParaRPr lang="de-DE"/>
-          </a:p>
-        </p:txBody>
-      </p:sp>
-    </p:spTree>
-  </p:cSld>
-  <p:clrMapOvr>
-    <a:masterClrMapping/>
-  </p:clrMapOvr>
-</p:sldLayout>
-</file>
-
-<file path=ppt/slideLayouts/slideLayout12.xml><?xml version="1.0" encoding="utf-8"?>
-<p:sldLayout xmlns:a="http://schemas.openxmlformats.org/drawingml/2006/main" xmlns:r="http://schemas.openxmlformats.org/officeDocument/2006/relationships" xmlns:p="http://schemas.openxmlformats.org/presentationml/2006/main" showMasterSp="0" type="title">
-  <p:cSld name="1_Titelfolie">
-    <p:spTree>
-      <p:nvGrpSpPr>
-        <p:cNvPr id="1" name=""/>
-        <p:cNvGrpSpPr/>
-        <p:nvPr/>
-      </p:nvGrpSpPr>
-      <p:grpSpPr>
-        <a:xfrm>
-          <a:off x="0" y="0"/>
-          <a:ext cx="0" cy="0"/>
-          <a:chOff x="0" y="0"/>
-          <a:chExt cx="0" cy="0"/>
-        </a:xfrm>
-      </p:grpSpPr>
-      <p:sp>
-        <p:nvSpPr>
-          <p:cNvPr id="36868" name="Rectangle 4"/>
-          <p:cNvSpPr>
-            <a:spLocks noGrp="1" noChangeArrowheads="1"/>
-          </p:cNvSpPr>
-          <p:nvPr>
-            <p:ph type="ctrTitle"/>
-          </p:nvPr>
-        </p:nvSpPr>
-        <p:spPr>
-          <a:xfrm>
-            <a:off x="395288" y="1268413"/>
-            <a:ext cx="8389937" cy="649287"/>
-          </a:xfrm>
-          <a:extLst>
-            <a:ext uri="{909E8E84-426E-40DD-AFC4-6F175D3DCCD1}">
-              <a14:hiddenFill xmlns:a14="http://schemas.microsoft.com/office/drawing/2010/main">
-                <a:solidFill>
-                  <a:srgbClr val="50AAE6"/>
-                </a:solidFill>
-              </a14:hiddenFill>
-            </a:ext>
-          </a:extLst>
-        </p:spPr>
-        <p:txBody>
-          <a:bodyPr/>
-          <a:lstStyle>
-            <a:lvl1pPr>
-              <a:lnSpc>
-                <a:spcPct val="90000"/>
-              </a:lnSpc>
-              <a:defRPr sz="2600"/>
-            </a:lvl1pPr>
-          </a:lstStyle>
-          <a:p>
-            <a:pPr lvl="0"/>
-            <a:r>
-              <a:rPr lang="de-DE" noProof="0" smtClean="0"/>
-              <a:t>Titel durch Klicken hinzufügen</a:t>
-            </a:r>
-          </a:p>
-        </p:txBody>
-      </p:sp>
-      <p:sp>
-        <p:nvSpPr>
-          <p:cNvPr id="36869" name="Rectangle 5"/>
-          <p:cNvSpPr>
-            <a:spLocks noGrp="1" noChangeArrowheads="1"/>
-          </p:cNvSpPr>
-          <p:nvPr>
-            <p:ph type="subTitle" idx="1"/>
-          </p:nvPr>
-        </p:nvSpPr>
-        <p:spPr>
-          <a:xfrm>
-            <a:off x="396875" y="2232025"/>
-            <a:ext cx="8370888" cy="620713"/>
-          </a:xfrm>
-        </p:spPr>
-        <p:txBody>
-          <a:bodyPr/>
-          <a:lstStyle>
-            <a:lvl1pPr marL="0" indent="0">
-              <a:spcBef>
-                <a:spcPct val="0"/>
-              </a:spcBef>
-              <a:buFontTx/>
-              <a:buNone/>
-              <a:defRPr sz="2000" b="1">
-                <a:solidFill>
-                  <a:srgbClr val="000000"/>
-                </a:solidFill>
-              </a:defRPr>
-            </a:lvl1pPr>
-          </a:lstStyle>
-          <a:p>
-            <a:pPr lvl="0"/>
-            <a:r>
-              <a:rPr lang="de-DE" noProof="0" smtClean="0"/>
-              <a:t>Untertitel durch Klicken hinzufügen</a:t>
-            </a:r>
+            <a:pPr>
+              <a:defRPr/>
+            </a:pPr>
+            <a:r>
+              <a:rPr lang="de-DE" smtClean="0"/>
+              <a:t>Surname Lastname - Presentation Title</a:t>
+            </a:r>
+            <a:endParaRPr lang="en-US"/>
           </a:p>
         </p:txBody>
       </p:sp>
@@ -2084,7 +1802,9 @@
         </p:nvSpPr>
         <p:spPr/>
         <p:txBody>
-          <a:bodyPr/>
+          <a:bodyPr>
+            <a:normAutofit/>
+          </a:bodyPr>
           <a:lstStyle>
             <a:lvl1pPr>
               <a:defRPr sz="2800"/>
@@ -2092,7 +1812,7 @@
           </a:lstStyle>
           <a:p>
             <a:r>
-              <a:rPr lang="de-DE" dirty="0" smtClean="0"/>
+              <a:rPr lang="de-DE" smtClean="0"/>
               <a:t>Titelmasterformat durch Klicken bearbeiten</a:t>
             </a:r>
             <a:endParaRPr lang="de-DE" dirty="0"/>
@@ -2106,18 +1826,19 @@
             <a:spLocks noGrp="1"/>
           </p:cNvSpPr>
           <p:nvPr>
-            <p:ph idx="1"/>
+            <p:ph idx="1" hasCustomPrompt="1"/>
           </p:nvPr>
         </p:nvSpPr>
         <p:spPr/>
         <p:txBody>
-          <a:bodyPr/>
+          <a:bodyPr>
+            <a:normAutofit/>
+          </a:bodyPr>
           <a:lstStyle>
-            <a:lvl1pPr marL="361950" indent="-361950">
+            <a:lvl1pPr marL="357188" indent="-357188">
               <a:spcBef>
                 <a:spcPts val="700"/>
               </a:spcBef>
-              <a:tabLst/>
               <a:defRPr/>
             </a:lvl1pPr>
             <a:lvl2pPr indent="-396000">
@@ -2149,7 +1870,7 @@
             <a:pPr lvl="0"/>
             <a:r>
               <a:rPr lang="de-DE" dirty="0" smtClean="0"/>
-              <a:t>Textmasterformat bearbeiten</a:t>
+              <a:t>Textmasterformate durch Klicken bearbeiten</a:t>
             </a:r>
           </a:p>
           <a:p>
@@ -2179,7 +1900,6 @@
               <a:rPr lang="de-DE" dirty="0" smtClean="0"/>
               <a:t>Fünfte Ebene</a:t>
             </a:r>
-            <a:endParaRPr lang="de-DE" dirty="0"/>
           </a:p>
         </p:txBody>
       </p:sp>
@@ -2204,11 +1924,34 @@
             </a:lvl1pPr>
           </a:lstStyle>
           <a:p>
-            <a:r>
-              <a:rPr lang="de-DE" smtClean="0"/>
-              <a:t>Name Vorname: Titel des Vortrags</a:t>
-            </a:r>
-            <a:endParaRPr lang="de-DE"/>
+            <a:pPr>
+              <a:defRPr/>
+            </a:pPr>
+            <a:r>
+              <a:rPr lang="de-DE" dirty="0" smtClean="0"/>
+              <a:t>Mao L., Wang C., Sebastian G. – </a:t>
+            </a:r>
+            <a:r>
+              <a:rPr lang="de-DE" dirty="0" err="1" smtClean="0"/>
+              <a:t>Ghosts</a:t>
+            </a:r>
+            <a:r>
+              <a:rPr lang="de-DE" dirty="0" smtClean="0"/>
+              <a:t> </a:t>
+            </a:r>
+            <a:r>
+              <a:rPr lang="de-DE" dirty="0" err="1" smtClean="0"/>
+              <a:t>activate</a:t>
+            </a:r>
+            <a:r>
+              <a:rPr lang="de-DE" dirty="0" smtClean="0"/>
+              <a:t> on </a:t>
+            </a:r>
+            <a:r>
+              <a:rPr lang="de-DE" dirty="0" err="1" smtClean="0"/>
+              <a:t>sight</a:t>
+            </a:r>
+            <a:endParaRPr lang="en-US" dirty="0"/>
           </a:p>
         </p:txBody>
       </p:sp>
@@ -2237,6 +1980,36 @@
           <a:chExt cx="0" cy="0"/>
         </a:xfrm>
       </p:grpSpPr>
+      <p:pic>
+        <p:nvPicPr>
+          <p:cNvPr id="5" name="Picture 9" descr="II_rahmen_neu_titel"/>
+          <p:cNvPicPr>
+            <a:picLocks noChangeAspect="1" noChangeArrowheads="1"/>
+          </p:cNvPicPr>
+          <p:nvPr userDrawn="1"/>
+        </p:nvPicPr>
+        <p:blipFill rotWithShape="1">
+          <a:blip r:embed="rId2" cstate="print"/>
+          <a:srcRect t="37542" b="10490"/>
+          <a:stretch/>
+        </p:blipFill>
+        <p:spPr bwMode="auto">
+          <a:xfrm>
+            <a:off x="0" y="2576285"/>
+            <a:ext cx="9144000" cy="3570515"/>
+          </a:xfrm>
+          <a:prstGeom prst="rect">
+            <a:avLst/>
+          </a:prstGeom>
+          <a:noFill/>
+          <a:ln w="9525">
+            <a:noFill/>
+            <a:miter lim="800000"/>
+            <a:headEnd/>
+            <a:tailEnd/>
+          </a:ln>
+        </p:spPr>
+      </p:pic>
       <p:sp>
         <p:nvSpPr>
           <p:cNvPr id="2" name="Titel 1"/>
@@ -2249,7 +2022,7 @@
         </p:nvSpPr>
         <p:spPr>
           <a:xfrm>
-            <a:off x="722313" y="4406900"/>
+            <a:off x="722313" y="3913424"/>
             <a:ext cx="7772400" cy="1362075"/>
           </a:xfrm>
         </p:spPr>
@@ -2276,13 +2049,13 @@
             <a:spLocks noGrp="1"/>
           </p:cNvSpPr>
           <p:nvPr>
-            <p:ph type="body" idx="1"/>
+            <p:ph type="body" idx="1" hasCustomPrompt="1"/>
           </p:nvPr>
         </p:nvSpPr>
         <p:spPr>
           <a:xfrm>
-            <a:off x="722313" y="2906713"/>
-            <a:ext cx="7772400" cy="1500187"/>
+            <a:off x="722313" y="2697581"/>
+            <a:ext cx="7772400" cy="931498"/>
           </a:xfrm>
         </p:spPr>
         <p:txBody>
@@ -2290,7 +2063,11 @@
           <a:lstStyle>
             <a:lvl1pPr marL="0" indent="0">
               <a:buNone/>
-              <a:defRPr sz="2000"/>
+              <a:defRPr sz="2000" b="1">
+                <a:solidFill>
+                  <a:schemeClr val="bg1"/>
+                </a:solidFill>
+              </a:defRPr>
             </a:lvl1pPr>
             <a:lvl2pPr marL="457200" indent="0">
               <a:buNone/>
@@ -2328,8 +2105,8 @@
           <a:p>
             <a:pPr lvl="0"/>
             <a:r>
-              <a:rPr lang="de-DE" smtClean="0"/>
-              <a:t>Textmasterformat bearbeiten</a:t>
+              <a:rPr lang="de-DE" dirty="0" smtClean="0"/>
+              <a:t>TEXTMASTERFORMATE DURCH KLICKEN BEARBEITEN</a:t>
             </a:r>
           </a:p>
         </p:txBody>
@@ -2355,11 +2132,14 @@
             </a:lvl1pPr>
           </a:lstStyle>
           <a:p>
-            <a:r>
-              <a:rPr lang="de-DE" smtClean="0"/>
-              <a:t>Name Vorname: Titel des Vortrags</a:t>
-            </a:r>
-            <a:endParaRPr lang="de-DE"/>
+            <a:pPr>
+              <a:defRPr/>
+            </a:pPr>
+            <a:r>
+              <a:rPr lang="de-DE" smtClean="0"/>
+              <a:t>Surname Lastname - Presentation Title</a:t>
+            </a:r>
+            <a:endParaRPr lang="en-US"/>
           </a:p>
         </p:txBody>
       </p:sp>
@@ -2372,7 +2152,7 @@
 </file>
 
 <file path=ppt/slideLayouts/slideLayout4.xml><?xml version="1.0" encoding="utf-8"?>
-<p:sldLayout xmlns:a="http://schemas.openxmlformats.org/drawingml/2006/main" xmlns:r="http://schemas.openxmlformats.org/officeDocument/2006/relationships" xmlns:p="http://schemas.openxmlformats.org/presentationml/2006/main" type="twoObj" preserve="1">
+<p:sldLayout xmlns:a="http://schemas.openxmlformats.org/drawingml/2006/main" xmlns:r="http://schemas.openxmlformats.org/officeDocument/2006/relationships" xmlns:p="http://schemas.openxmlformats.org/presentationml/2006/main" preserve="1" userDrawn="1">
   <p:cSld name="Zwei Inhalte">
     <p:spTree>
       <p:nvGrpSpPr>
@@ -2388,29 +2168,6 @@
           <a:chExt cx="0" cy="0"/>
         </a:xfrm>
       </p:grpSpPr>
-      <p:sp>
-        <p:nvSpPr>
-          <p:cNvPr id="2" name="Titel 1"/>
-          <p:cNvSpPr>
-            <a:spLocks noGrp="1"/>
-          </p:cNvSpPr>
-          <p:nvPr>
-            <p:ph type="title"/>
-          </p:nvPr>
-        </p:nvSpPr>
-        <p:spPr/>
-        <p:txBody>
-          <a:bodyPr/>
-          <a:lstStyle/>
-          <a:p>
-            <a:r>
-              <a:rPr lang="de-DE" smtClean="0"/>
-              <a:t>Titelmasterformat durch Klicken bearbeiten</a:t>
-            </a:r>
-            <a:endParaRPr lang="de-DE"/>
-          </a:p>
-        </p:txBody>
-      </p:sp>
       <p:sp>
         <p:nvSpPr>
           <p:cNvPr id="3" name="Inhaltsplatzhalter 2"/>
@@ -2462,7 +2219,7 @@
             <a:pPr lvl="0"/>
             <a:r>
               <a:rPr lang="de-DE" smtClean="0"/>
-              <a:t>Textmasterformat bearbeiten</a:t>
+              <a:t>Textmasterformate durch Klicken bearbeiten</a:t>
             </a:r>
           </a:p>
           <a:p>
@@ -2547,7 +2304,7 @@
             <a:pPr lvl="0"/>
             <a:r>
               <a:rPr lang="de-DE" smtClean="0"/>
-              <a:t>Textmasterformat bearbeiten</a:t>
+              <a:t>Textmasterformate durch Klicken bearbeiten</a:t>
             </a:r>
           </a:p>
           <a:p>
@@ -2602,11 +2359,48 @@
             </a:lvl1pPr>
           </a:lstStyle>
           <a:p>
-            <a:r>
-              <a:rPr lang="de-DE" smtClean="0"/>
-              <a:t>Name Vorname: Titel des Vortrags</a:t>
-            </a:r>
-            <a:endParaRPr lang="de-DE"/>
+            <a:pPr>
+              <a:defRPr/>
+            </a:pPr>
+            <a:r>
+              <a:rPr lang="de-DE" smtClean="0"/>
+              <a:t>Surname Lastname - Presentation Title</a:t>
+            </a:r>
+            <a:endParaRPr lang="en-US"/>
+          </a:p>
+        </p:txBody>
+      </p:sp>
+      <p:sp>
+        <p:nvSpPr>
+          <p:cNvPr id="6" name="Titel 1"/>
+          <p:cNvSpPr>
+            <a:spLocks noGrp="1"/>
+          </p:cNvSpPr>
+          <p:nvPr>
+            <p:ph type="title"/>
+          </p:nvPr>
+        </p:nvSpPr>
+        <p:spPr>
+          <a:xfrm>
+            <a:off x="390525" y="333375"/>
+            <a:ext cx="6911975" cy="561975"/>
+          </a:xfrm>
+        </p:spPr>
+        <p:txBody>
+          <a:bodyPr>
+            <a:normAutofit/>
+          </a:bodyPr>
+          <a:lstStyle>
+            <a:lvl1pPr>
+              <a:defRPr sz="2800"/>
+            </a:lvl1pPr>
+          </a:lstStyle>
+          <a:p>
+            <a:r>
+              <a:rPr lang="de-DE" smtClean="0"/>
+              <a:t>Titelmasterformat durch Klicken bearbeiten</a:t>
+            </a:r>
+            <a:endParaRPr lang="de-DE" dirty="0"/>
           </a:p>
         </p:txBody>
       </p:sp>
@@ -2619,7 +2413,7 @@
 </file>
 
 <file path=ppt/slideLayouts/slideLayout5.xml><?xml version="1.0" encoding="utf-8"?>
-<p:sldLayout xmlns:a="http://schemas.openxmlformats.org/drawingml/2006/main" xmlns:r="http://schemas.openxmlformats.org/officeDocument/2006/relationships" xmlns:p="http://schemas.openxmlformats.org/presentationml/2006/main" type="twoTxTwoObj" preserve="1">
+<p:sldLayout xmlns:a="http://schemas.openxmlformats.org/drawingml/2006/main" xmlns:r="http://schemas.openxmlformats.org/officeDocument/2006/relationships" xmlns:p="http://schemas.openxmlformats.org/presentationml/2006/main" preserve="1" userDrawn="1">
   <p:cSld name="Vergleich">
     <p:spTree>
       <p:nvGrpSpPr>
@@ -2637,38 +2431,6 @@
       </p:grpSpPr>
       <p:sp>
         <p:nvSpPr>
-          <p:cNvPr id="2" name="Titel 1"/>
-          <p:cNvSpPr>
-            <a:spLocks noGrp="1"/>
-          </p:cNvSpPr>
-          <p:nvPr>
-            <p:ph type="title"/>
-          </p:nvPr>
-        </p:nvSpPr>
-        <p:spPr>
-          <a:xfrm>
-            <a:off x="457200" y="274638"/>
-            <a:ext cx="8229600" cy="1143000"/>
-          </a:xfrm>
-        </p:spPr>
-        <p:txBody>
-          <a:bodyPr/>
-          <a:lstStyle>
-            <a:lvl1pPr>
-              <a:defRPr/>
-            </a:lvl1pPr>
-          </a:lstStyle>
-          <a:p>
-            <a:r>
-              <a:rPr lang="de-DE" smtClean="0"/>
-              <a:t>Titelmasterformat durch Klicken bearbeiten</a:t>
-            </a:r>
-            <a:endParaRPr lang="de-DE"/>
-          </a:p>
-        </p:txBody>
-      </p:sp>
-      <p:sp>
-        <p:nvSpPr>
           <p:cNvPr id="3" name="Textplatzhalter 2"/>
           <p:cNvSpPr>
             <a:spLocks noGrp="1"/>
@@ -2679,7 +2441,7 @@
         </p:nvSpPr>
         <p:spPr>
           <a:xfrm>
-            <a:off x="457200" y="1535113"/>
+            <a:off x="457200" y="1186777"/>
             <a:ext cx="4040188" cy="639762"/>
           </a:xfrm>
         </p:spPr>
@@ -2726,8 +2488,8 @@
           <a:p>
             <a:pPr lvl="0"/>
             <a:r>
-              <a:rPr lang="de-DE" smtClean="0"/>
-              <a:t>Textmasterformat bearbeiten</a:t>
+              <a:rPr lang="de-DE" dirty="0" smtClean="0"/>
+              <a:t>Textmasterformate durch Klicken bearbeiten</a:t>
             </a:r>
           </a:p>
         </p:txBody>
@@ -2744,8 +2506,8 @@
         </p:nvSpPr>
         <p:spPr>
           <a:xfrm>
-            <a:off x="457200" y="2174875"/>
-            <a:ext cx="4040188" cy="3951288"/>
+            <a:off x="457200" y="1826538"/>
+            <a:ext cx="4040188" cy="4305747"/>
           </a:xfrm>
         </p:spPr>
         <p:txBody>
@@ -2783,7 +2545,7 @@
             <a:pPr lvl="0"/>
             <a:r>
               <a:rPr lang="de-DE" smtClean="0"/>
-              <a:t>Textmasterformat bearbeiten</a:t>
+              <a:t>Textmasterformate durch Klicken bearbeiten</a:t>
             </a:r>
           </a:p>
           <a:p>
@@ -2829,7 +2591,7 @@
         </p:nvSpPr>
         <p:spPr>
           <a:xfrm>
-            <a:off x="4645025" y="1535113"/>
+            <a:off x="4645025" y="1186777"/>
             <a:ext cx="4041775" cy="639762"/>
           </a:xfrm>
         </p:spPr>
@@ -2877,7 +2639,7 @@
             <a:pPr lvl="0"/>
             <a:r>
               <a:rPr lang="de-DE" smtClean="0"/>
-              <a:t>Textmasterformat bearbeiten</a:t>
+              <a:t>Textmasterformate durch Klicken bearbeiten</a:t>
             </a:r>
           </a:p>
         </p:txBody>
@@ -2894,8 +2656,8 @@
         </p:nvSpPr>
         <p:spPr>
           <a:xfrm>
-            <a:off x="4645025" y="2174875"/>
-            <a:ext cx="4041775" cy="3951288"/>
+            <a:off x="4645025" y="1826539"/>
+            <a:ext cx="4041775" cy="4313004"/>
           </a:xfrm>
         </p:spPr>
         <p:txBody>
@@ -2933,7 +2695,7 @@
             <a:pPr lvl="0"/>
             <a:r>
               <a:rPr lang="de-DE" smtClean="0"/>
-              <a:t>Textmasterformat bearbeiten</a:t>
+              <a:t>Textmasterformate durch Klicken bearbeiten</a:t>
             </a:r>
           </a:p>
           <a:p>
@@ -2988,11 +2750,48 @@
             </a:lvl1pPr>
           </a:lstStyle>
           <a:p>
-            <a:r>
-              <a:rPr lang="de-DE" smtClean="0"/>
-              <a:t>Name Vorname: Titel des Vortrags</a:t>
-            </a:r>
-            <a:endParaRPr lang="de-DE"/>
+            <a:pPr>
+              <a:defRPr/>
+            </a:pPr>
+            <a:r>
+              <a:rPr lang="de-DE" smtClean="0"/>
+              <a:t>Surname Lastname - Presentation Title</a:t>
+            </a:r>
+            <a:endParaRPr lang="en-US"/>
+          </a:p>
+        </p:txBody>
+      </p:sp>
+      <p:sp>
+        <p:nvSpPr>
+          <p:cNvPr id="8" name="Titel 1"/>
+          <p:cNvSpPr>
+            <a:spLocks noGrp="1"/>
+          </p:cNvSpPr>
+          <p:nvPr>
+            <p:ph type="title"/>
+          </p:nvPr>
+        </p:nvSpPr>
+        <p:spPr>
+          <a:xfrm>
+            <a:off x="390525" y="333375"/>
+            <a:ext cx="6911975" cy="561975"/>
+          </a:xfrm>
+        </p:spPr>
+        <p:txBody>
+          <a:bodyPr>
+            <a:normAutofit/>
+          </a:bodyPr>
+          <a:lstStyle>
+            <a:lvl1pPr>
+              <a:defRPr sz="2800"/>
+            </a:lvl1pPr>
+          </a:lstStyle>
+          <a:p>
+            <a:r>
+              <a:rPr lang="de-DE" smtClean="0"/>
+              <a:t>Titelmasterformat durch Klicken bearbeiten</a:t>
+            </a:r>
+            <a:endParaRPr lang="de-DE" dirty="0"/>
           </a:p>
         </p:txBody>
       </p:sp>
@@ -3005,7 +2804,7 @@
 </file>
 
 <file path=ppt/slideLayouts/slideLayout6.xml><?xml version="1.0" encoding="utf-8"?>
-<p:sldLayout xmlns:a="http://schemas.openxmlformats.org/drawingml/2006/main" xmlns:r="http://schemas.openxmlformats.org/officeDocument/2006/relationships" xmlns:p="http://schemas.openxmlformats.org/presentationml/2006/main" type="titleOnly" preserve="1">
+<p:sldLayout xmlns:a="http://schemas.openxmlformats.org/drawingml/2006/main" xmlns:r="http://schemas.openxmlformats.org/officeDocument/2006/relationships" xmlns:p="http://schemas.openxmlformats.org/presentationml/2006/main" preserve="1" userDrawn="1">
   <p:cSld name="Nur Titel">
     <p:spTree>
       <p:nvGrpSpPr>
@@ -3023,29 +2822,6 @@
       </p:grpSpPr>
       <p:sp>
         <p:nvSpPr>
-          <p:cNvPr id="2" name="Titel 1"/>
-          <p:cNvSpPr>
-            <a:spLocks noGrp="1"/>
-          </p:cNvSpPr>
-          <p:nvPr>
-            <p:ph type="title"/>
-          </p:nvPr>
-        </p:nvSpPr>
-        <p:spPr/>
-        <p:txBody>
-          <a:bodyPr/>
-          <a:lstStyle/>
-          <a:p>
-            <a:r>
-              <a:rPr lang="de-DE" smtClean="0"/>
-              <a:t>Titelmasterformat durch Klicken bearbeiten</a:t>
-            </a:r>
-            <a:endParaRPr lang="de-DE"/>
-          </a:p>
-        </p:txBody>
-      </p:sp>
-      <p:sp>
-        <p:nvSpPr>
           <p:cNvPr id="3" name="Rectangle 12"/>
           <p:cNvSpPr>
             <a:spLocks noGrp="1" noChangeArrowheads="1"/>
@@ -3065,11 +2841,48 @@
             </a:lvl1pPr>
           </a:lstStyle>
           <a:p>
-            <a:r>
-              <a:rPr lang="de-DE" smtClean="0"/>
-              <a:t>Name Vorname: Titel des Vortrags</a:t>
-            </a:r>
-            <a:endParaRPr lang="de-DE"/>
+            <a:pPr>
+              <a:defRPr/>
+            </a:pPr>
+            <a:r>
+              <a:rPr lang="de-DE" smtClean="0"/>
+              <a:t>Surname Lastname - Presentation Title</a:t>
+            </a:r>
+            <a:endParaRPr lang="en-US"/>
+          </a:p>
+        </p:txBody>
+      </p:sp>
+      <p:sp>
+        <p:nvSpPr>
+          <p:cNvPr id="4" name="Titel 1"/>
+          <p:cNvSpPr>
+            <a:spLocks noGrp="1"/>
+          </p:cNvSpPr>
+          <p:nvPr>
+            <p:ph type="title"/>
+          </p:nvPr>
+        </p:nvSpPr>
+        <p:spPr>
+          <a:xfrm>
+            <a:off x="390525" y="333375"/>
+            <a:ext cx="6911975" cy="561975"/>
+          </a:xfrm>
+        </p:spPr>
+        <p:txBody>
+          <a:bodyPr>
+            <a:normAutofit/>
+          </a:bodyPr>
+          <a:lstStyle>
+            <a:lvl1pPr>
+              <a:defRPr sz="2800"/>
+            </a:lvl1pPr>
+          </a:lstStyle>
+          <a:p>
+            <a:r>
+              <a:rPr lang="de-DE" smtClean="0"/>
+              <a:t>Titelmasterformat durch Klicken bearbeiten</a:t>
+            </a:r>
+            <a:endParaRPr lang="de-DE" dirty="0"/>
           </a:p>
         </p:txBody>
       </p:sp>
@@ -3119,11 +2932,14 @@
             </a:lvl1pPr>
           </a:lstStyle>
           <a:p>
-            <a:r>
-              <a:rPr lang="de-DE" smtClean="0"/>
-              <a:t>Name Vorname: Titel des Vortrags</a:t>
-            </a:r>
-            <a:endParaRPr lang="de-DE"/>
+            <a:pPr>
+              <a:defRPr/>
+            </a:pPr>
+            <a:r>
+              <a:rPr lang="de-DE" smtClean="0"/>
+              <a:t>Surname Lastname - Presentation Title</a:t>
+            </a:r>
+            <a:endParaRPr lang="en-US"/>
           </a:p>
         </p:txBody>
       </p:sp>
@@ -3235,7 +3051,7 @@
             <a:pPr lvl="0"/>
             <a:r>
               <a:rPr lang="de-DE" smtClean="0"/>
-              <a:t>Textmasterformat bearbeiten</a:t>
+              <a:t>Textmasterformate durch Klicken bearbeiten</a:t>
             </a:r>
           </a:p>
           <a:p>
@@ -3329,7 +3145,7 @@
             <a:pPr lvl="0"/>
             <a:r>
               <a:rPr lang="de-DE" smtClean="0"/>
-              <a:t>Textmasterformat bearbeiten</a:t>
+              <a:t>Textmasterformate durch Klicken bearbeiten</a:t>
             </a:r>
           </a:p>
         </p:txBody>
@@ -3355,11 +3171,14 @@
             </a:lvl1pPr>
           </a:lstStyle>
           <a:p>
-            <a:r>
-              <a:rPr lang="de-DE" smtClean="0"/>
-              <a:t>Name Vorname: Titel des Vortrags</a:t>
-            </a:r>
-            <a:endParaRPr lang="de-DE"/>
+            <a:pPr>
+              <a:defRPr/>
+            </a:pPr>
+            <a:r>
+              <a:rPr lang="de-DE" smtClean="0"/>
+              <a:t>Surname Lastname - Presentation Title</a:t>
+            </a:r>
+            <a:endParaRPr lang="en-US"/>
           </a:p>
         </p:txBody>
       </p:sp>
@@ -3545,7 +3364,7 @@
             <a:pPr lvl="0"/>
             <a:r>
               <a:rPr lang="de-DE" smtClean="0"/>
-              <a:t>Textmasterformat bearbeiten</a:t>
+              <a:t>Textmasterformate durch Klicken bearbeiten</a:t>
             </a:r>
           </a:p>
         </p:txBody>
@@ -3571,11 +3390,14 @@
             </a:lvl1pPr>
           </a:lstStyle>
           <a:p>
-            <a:r>
-              <a:rPr lang="de-DE" smtClean="0"/>
-              <a:t>Name Vorname: Titel des Vortrags</a:t>
-            </a:r>
-            <a:endParaRPr lang="de-DE"/>
+            <a:pPr>
+              <a:defRPr/>
+            </a:pPr>
+            <a:r>
+              <a:rPr lang="de-DE" smtClean="0"/>
+              <a:t>Surname Lastname - Presentation Title</a:t>
+            </a:r>
+            <a:endParaRPr lang="en-US"/>
           </a:p>
         </p:txBody>
       </p:sp>
@@ -3621,7 +3443,7 @@
           <p:nvPr/>
         </p:nvPicPr>
         <p:blipFill>
-          <a:blip r:embed="rId14" cstate="print"/>
+          <a:blip r:embed="rId13" cstate="print"/>
           <a:srcRect/>
           <a:stretch>
             <a:fillRect/>
@@ -3680,7 +3502,7 @@
           <a:p>
             <a:pPr lvl="0"/>
             <a:r>
-              <a:rPr lang="de-DE" noProof="0" smtClean="0"/>
+              <a:rPr lang="en-US" dirty="0" smtClean="0"/>
               <a:t>Click to add title</a:t>
             </a:r>
           </a:p>
@@ -3699,7 +3521,7 @@
         <p:spPr bwMode="auto">
           <a:xfrm>
             <a:off x="392113" y="1198563"/>
-            <a:ext cx="8356600" cy="4745037"/>
+            <a:ext cx="8356600" cy="4712380"/>
           </a:xfrm>
           <a:prstGeom prst="rect">
             <a:avLst/>
@@ -3722,107 +3544,37 @@
           <a:p>
             <a:pPr lvl="0"/>
             <a:r>
-              <a:rPr lang="de-DE" noProof="0" smtClean="0"/>
+              <a:rPr lang="en-US" dirty="0" smtClean="0"/>
               <a:t>Click to add text</a:t>
             </a:r>
           </a:p>
           <a:p>
             <a:pPr lvl="1"/>
             <a:r>
-              <a:rPr lang="de-DE" noProof="0" smtClean="0"/>
+              <a:rPr lang="en-US" dirty="0" smtClean="0"/>
               <a:t>Second level</a:t>
             </a:r>
           </a:p>
           <a:p>
             <a:pPr lvl="2"/>
             <a:r>
-              <a:rPr lang="de-DE" noProof="0" smtClean="0"/>
+              <a:rPr lang="en-US" dirty="0" smtClean="0"/>
               <a:t>Third level</a:t>
             </a:r>
           </a:p>
           <a:p>
             <a:pPr lvl="3"/>
             <a:r>
-              <a:rPr lang="de-DE" noProof="0" smtClean="0"/>
+              <a:rPr lang="en-US" dirty="0" smtClean="0"/>
               <a:t>Fourth level</a:t>
             </a:r>
           </a:p>
           <a:p>
             <a:pPr lvl="4"/>
             <a:r>
-              <a:rPr lang="de-DE" noProof="0" smtClean="0"/>
+              <a:rPr lang="en-US" dirty="0" smtClean="0"/>
               <a:t>Fifth level</a:t>
             </a:r>
-          </a:p>
-        </p:txBody>
-      </p:sp>
-      <p:sp>
-        <p:nvSpPr>
-          <p:cNvPr id="1034" name="Text Box 10"/>
-          <p:cNvSpPr txBox="1">
-            <a:spLocks noChangeArrowheads="1"/>
-          </p:cNvSpPr>
-          <p:nvPr/>
-        </p:nvSpPr>
-        <p:spPr bwMode="auto">
-          <a:xfrm>
-            <a:off x="5850190" y="6433521"/>
-            <a:ext cx="3183655" cy="360362"/>
-          </a:xfrm>
-          <a:prstGeom prst="rect">
-            <a:avLst/>
-          </a:prstGeom>
-          <a:noFill/>
-          <a:ln w="9525">
-            <a:noFill/>
-            <a:miter lim="800000"/>
-            <a:headEnd/>
-            <a:tailEnd/>
-          </a:ln>
-          <a:effectLst/>
-        </p:spPr>
-        <p:txBody>
-          <a:bodyPr lIns="0" tIns="0" rIns="0" bIns="0"/>
-          <a:lstStyle/>
-          <a:p>
-            <a:pPr algn="r">
-              <a:spcBef>
-                <a:spcPct val="50000"/>
-              </a:spcBef>
-              <a:defRPr/>
-            </a:pPr>
-            <a:r>
-              <a:rPr lang="de-DE" sz="1000" noProof="0" smtClean="0">
-                <a:latin typeface="Arial" pitchFamily="34" charset="0"/>
-              </a:rPr>
-              <a:t>Software-Entwurf</a:t>
-            </a:r>
-            <a:r>
-              <a:rPr lang="de-DE" sz="1000" baseline="0" noProof="0" smtClean="0">
-                <a:latin typeface="Arial" pitchFamily="34" charset="0"/>
-              </a:rPr>
-              <a:t> und -Qualität</a:t>
-            </a:r>
-            <a:r>
-              <a:rPr lang="de-DE" sz="1000" noProof="0" smtClean="0">
-                <a:latin typeface="Arial" pitchFamily="34" charset="0"/>
-              </a:rPr>
-              <a:t/>
-            </a:r>
-            <a:br>
-              <a:rPr lang="de-DE" sz="1000" noProof="0" smtClean="0">
-                <a:latin typeface="Arial" pitchFamily="34" charset="0"/>
-              </a:rPr>
-            </a:br>
-            <a:r>
-              <a:rPr lang="de-DE" sz="1000" noProof="0" smtClean="0">
-                <a:latin typeface="Arial" pitchFamily="34" charset="0"/>
-              </a:rPr>
-              <a:t>Institut für Programmstrukturen und Datenorganisation</a:t>
-            </a:r>
-            <a:endParaRPr lang="de-DE" sz="1000" noProof="0">
-              <a:latin typeface="Arial" pitchFamily="34" charset="0"/>
-            </a:endParaRPr>
           </a:p>
         </p:txBody>
       </p:sp>
@@ -3881,12 +3633,12 @@
           <p:cNvSpPr>
             <a:spLocks noChangeArrowheads="1"/>
           </p:cNvSpPr>
-          <p:nvPr/>
+          <p:nvPr userDrawn="1"/>
         </p:nvSpPr>
         <p:spPr bwMode="auto">
           <a:xfrm>
             <a:off x="504623" y="6445250"/>
-            <a:ext cx="863600" cy="360363"/>
+            <a:ext cx="733771" cy="360363"/>
           </a:xfrm>
           <a:prstGeom prst="rect">
             <a:avLst/>
@@ -3907,15 +3659,12 @@
             <a:pPr>
               <a:defRPr/>
             </a:pPr>
-            <a:fld id="{FBF0773F-9DFE-4213-A82A-43FB290BE3C2}" type="datetime1">
-              <a:rPr lang="de-DE" sz="1000">
+            <a:r>
+              <a:rPr lang="de-DE" sz="1000" dirty="0" smtClean="0">
                 <a:latin typeface="Arial" pitchFamily="34" charset="0"/>
               </a:rPr>
-              <a:pPr>
-                <a:defRPr/>
-              </a:pPr>
-              <a:t>30.01.2016</a:t>
-            </a:fld>
+              <a:t>16-01-30</a:t>
+            </a:r>
             <a:endParaRPr lang="de-DE" sz="1000" dirty="0">
               <a:latin typeface="Arial" pitchFamily="34" charset="0"/>
             </a:endParaRPr>
@@ -3963,11 +3712,34 @@
             </a:lvl1pPr>
           </a:lstStyle>
           <a:p>
-            <a:r>
-              <a:rPr lang="de-DE" smtClean="0"/>
-              <a:t>Name Vorname: Titel des Vortrags</a:t>
-            </a:r>
-            <a:endParaRPr lang="de-DE"/>
+            <a:pPr>
+              <a:defRPr/>
+            </a:pPr>
+            <a:r>
+              <a:rPr lang="de-DE" dirty="0" smtClean="0"/>
+              <a:t>Mao L., Wang C., Sebastian G. – </a:t>
+            </a:r>
+            <a:r>
+              <a:rPr lang="de-DE" dirty="0" err="1" smtClean="0"/>
+              <a:t>Ghosts</a:t>
+            </a:r>
+            <a:r>
+              <a:rPr lang="de-DE" dirty="0" smtClean="0"/>
+              <a:t> </a:t>
+            </a:r>
+            <a:r>
+              <a:rPr lang="de-DE" dirty="0" err="1" smtClean="0"/>
+              <a:t>activate</a:t>
+            </a:r>
+            <a:r>
+              <a:rPr lang="de-DE" dirty="0" smtClean="0"/>
+              <a:t> on </a:t>
+            </a:r>
+            <a:r>
+              <a:rPr lang="de-DE" dirty="0" err="1" smtClean="0"/>
+              <a:t>sight</a:t>
+            </a:r>
+            <a:endParaRPr lang="en-US" dirty="0"/>
           </a:p>
         </p:txBody>
       </p:sp>
@@ -3980,7 +3752,7 @@
           <p:nvPr/>
         </p:nvPicPr>
         <p:blipFill>
-          <a:blip r:embed="rId15" cstate="print"/>
+          <a:blip r:embed="rId14" cstate="print"/>
           <a:srcRect/>
           <a:stretch>
             <a:fillRect/>
@@ -4003,65 +3775,23 @@
           </a:ln>
         </p:spPr>
       </p:pic>
-      <p:pic>
-        <p:nvPicPr>
-          <p:cNvPr id="10" name="Picture 2" descr="C:\versioned\KlausSVN\Dissertation\presentations\Disputation\kit_logo_de_farbe_positiv.jpg"/>
-          <p:cNvPicPr>
-            <a:picLocks noChangeAspect="1" noChangeArrowheads="1"/>
-          </p:cNvPicPr>
-          <p:nvPr userDrawn="1"/>
-        </p:nvPicPr>
-        <p:blipFill>
-          <a:blip r:embed="rId16" cstate="print">
-            <a:extLst>
-              <a:ext uri="{28A0092B-C50C-407E-A947-70E740481C1C}">
-                <a14:useLocalDpi xmlns:a14="http://schemas.microsoft.com/office/drawing/2010/main" val="0"/>
-              </a:ext>
-            </a:extLst>
-          </a:blip>
-          <a:srcRect/>
-          <a:stretch>
-            <a:fillRect/>
-          </a:stretch>
-        </p:blipFill>
-        <p:spPr bwMode="auto">
-          <a:xfrm>
-            <a:off x="7668760" y="341313"/>
-            <a:ext cx="1083128" cy="495300"/>
-          </a:xfrm>
-          <a:prstGeom prst="rect">
-            <a:avLst/>
-          </a:prstGeom>
-          <a:noFill/>
-          <a:extLst>
-            <a:ext uri="{909E8E84-426E-40DD-AFC4-6F175D3DCCD1}">
-              <a14:hiddenFill xmlns:a14="http://schemas.microsoft.com/office/drawing/2010/main">
-                <a:solidFill>
-                  <a:srgbClr val="FFFFFF"/>
-                </a:solidFill>
-              </a14:hiddenFill>
-            </a:ext>
-          </a:extLst>
-        </p:spPr>
-      </p:pic>
     </p:spTree>
   </p:cSld>
   <p:clrMap bg1="lt1" tx1="dk1" bg2="lt2" tx2="dk2" accent1="accent1" accent2="accent2" accent3="accent3" accent4="accent4" accent5="accent5" accent6="accent6" hlink="hlink" folHlink="folHlink"/>
   <p:sldLayoutIdLst>
-    <p:sldLayoutId id="2147483677" r:id="rId1"/>
-    <p:sldLayoutId id="2147483678" r:id="rId2"/>
-    <p:sldLayoutId id="2147483679" r:id="rId3"/>
-    <p:sldLayoutId id="2147483680" r:id="rId4"/>
-    <p:sldLayoutId id="2147483681" r:id="rId5"/>
-    <p:sldLayoutId id="2147483682" r:id="rId6"/>
-    <p:sldLayoutId id="2147483683" r:id="rId7"/>
-    <p:sldLayoutId id="2147483684" r:id="rId8"/>
-    <p:sldLayoutId id="2147483685" r:id="rId9"/>
-    <p:sldLayoutId id="2147483686" r:id="rId10"/>
-    <p:sldLayoutId id="2147483687" r:id="rId11"/>
-    <p:sldLayoutId id="2147483688" r:id="rId12"/>
+    <p:sldLayoutId id="2147483683" r:id="rId1"/>
+    <p:sldLayoutId id="2147483673" r:id="rId2"/>
+    <p:sldLayoutId id="2147483674" r:id="rId3"/>
+    <p:sldLayoutId id="2147483675" r:id="rId4"/>
+    <p:sldLayoutId id="2147483676" r:id="rId5"/>
+    <p:sldLayoutId id="2147483677" r:id="rId6"/>
+    <p:sldLayoutId id="2147483678" r:id="rId7"/>
+    <p:sldLayoutId id="2147483679" r:id="rId8"/>
+    <p:sldLayoutId id="2147483680" r:id="rId9"/>
+    <p:sldLayoutId id="2147483681" r:id="rId10"/>
+    <p:sldLayoutId id="2147483682" r:id="rId11"/>
   </p:sldLayoutIdLst>
-  <p:hf sldNum="0" hdr="0" dt="0"/>
+  <p:hf sldNum="0" hdr="0"/>
   <p:txStyles>
     <p:titleStyle>
       <a:lvl1pPr algn="l" rtl="0" eaLnBrk="1" fontAlgn="base" hangingPunct="1">
@@ -4194,7 +3924,7 @@
       </a:lvl9pPr>
     </p:titleStyle>
     <p:bodyStyle>
-      <a:lvl1pPr marL="314325" indent="-314325" algn="l" rtl="0" eaLnBrk="1" fontAlgn="base" hangingPunct="1">
+      <a:lvl1pPr marL="357188" indent="-357188" algn="l" rtl="0" eaLnBrk="1" fontAlgn="base" hangingPunct="1">
         <a:spcBef>
           <a:spcPct val="20000"/>
         </a:spcBef>
@@ -4202,7 +3932,7 @@
           <a:spcPct val="0"/>
         </a:spcAft>
         <a:buBlip>
-          <a:blip r:embed="rId17"/>
+          <a:blip r:embed="rId15"/>
         </a:buBlip>
         <a:defRPr sz="2800">
           <a:solidFill>
@@ -4221,7 +3951,7 @@
           <a:spcPct val="0"/>
         </a:spcAft>
         <a:buBlip>
-          <a:blip r:embed="rId18"/>
+          <a:blip r:embed="rId16"/>
         </a:buBlip>
         <a:defRPr sz="2400">
           <a:solidFill>
@@ -4238,7 +3968,7 @@
           <a:spcPct val="0"/>
         </a:spcAft>
         <a:buBlip>
-          <a:blip r:embed="rId19"/>
+          <a:blip r:embed="rId17"/>
         </a:buBlip>
         <a:defRPr sz="2000">
           <a:solidFill>
@@ -4255,7 +3985,7 @@
           <a:spcPct val="0"/>
         </a:spcAft>
         <a:buBlip>
-          <a:blip r:embed="rId19"/>
+          <a:blip r:embed="rId17"/>
         </a:buBlip>
         <a:defRPr sz="2000">
           <a:solidFill>
@@ -4272,7 +4002,7 @@
           <a:spcPct val="0"/>
         </a:spcAft>
         <a:buBlip>
-          <a:blip r:embed="rId19"/>
+          <a:blip r:embed="rId17"/>
         </a:buBlip>
         <a:defRPr sz="1800">
           <a:solidFill>
@@ -4290,7 +4020,7 @@
         </a:spcAft>
         <a:buSzPct val="60000"/>
         <a:buBlip>
-          <a:blip r:embed="rId20"/>
+          <a:blip r:embed="rId18"/>
         </a:buBlip>
         <a:defRPr sz="1400">
           <a:solidFill>
@@ -4308,7 +4038,7 @@
         </a:spcAft>
         <a:buSzPct val="60000"/>
         <a:buBlip>
-          <a:blip r:embed="rId20"/>
+          <a:blip r:embed="rId18"/>
         </a:buBlip>
         <a:defRPr sz="1400">
           <a:solidFill>
@@ -4326,7 +4056,7 @@
         </a:spcAft>
         <a:buSzPct val="60000"/>
         <a:buBlip>
-          <a:blip r:embed="rId20"/>
+          <a:blip r:embed="rId18"/>
         </a:buBlip>
         <a:defRPr sz="1400">
           <a:solidFill>
@@ -4344,7 +4074,7 @@
         </a:spcAft>
         <a:buSzPct val="60000"/>
         <a:buBlip>
-          <a:blip r:embed="rId20"/>
+          <a:blip r:embed="rId18"/>
         </a:buBlip>
         <a:defRPr sz="1400">
           <a:solidFill>
@@ -4472,52 +4202,94 @@
       </p:grpSpPr>
       <p:sp>
         <p:nvSpPr>
-          <p:cNvPr id="4098" name="Rectangle 2"/>
-          <p:cNvSpPr>
-            <a:spLocks noGrp="1" noChangeArrowheads="1"/>
-          </p:cNvSpPr>
-          <p:nvPr>
-            <p:ph type="ctrTitle" idx="4294967295"/>
-          </p:nvPr>
-        </p:nvSpPr>
-        <p:spPr>
+          <p:cNvPr id="3074" name="Rectangle 2"/>
+          <p:cNvSpPr>
+            <a:spLocks noChangeArrowheads="1"/>
+          </p:cNvSpPr>
+          <p:nvPr/>
+        </p:nvSpPr>
+        <p:spPr bwMode="auto">
           <a:xfrm>
-            <a:off x="381000" y="1701800"/>
-            <a:ext cx="8389937" cy="649287"/>
+            <a:off x="395288" y="1412875"/>
+            <a:ext cx="8389937" cy="720725"/>
           </a:xfrm>
+          <a:prstGeom prst="rect">
+            <a:avLst/>
+          </a:prstGeom>
+          <a:noFill/>
+          <a:ln w="9525">
+            <a:noFill/>
+            <a:miter lim="800000"/>
+            <a:headEnd/>
+            <a:tailEnd/>
+          </a:ln>
         </p:spPr>
         <p:txBody>
-          <a:bodyPr/>
+          <a:bodyPr lIns="0" tIns="0" rIns="0" bIns="0" anchor="b"/>
           <a:lstStyle/>
           <a:p>
-            <a:endParaRPr lang="de-DE" sz="2200" noProof="0" dirty="0"/>
-          </a:p>
-        </p:txBody>
-      </p:sp>
-      <p:sp>
-        <p:nvSpPr>
-          <p:cNvPr id="4099" name="Rectangle 3"/>
-          <p:cNvSpPr>
-            <a:spLocks noGrp="1" noChangeArrowheads="1"/>
-          </p:cNvSpPr>
-          <p:nvPr>
-            <p:ph type="subTitle" idx="4294967295"/>
-          </p:nvPr>
-        </p:nvSpPr>
-        <p:spPr>
+            <a:pPr>
+              <a:lnSpc>
+                <a:spcPct val="90000"/>
+              </a:lnSpc>
+            </a:pPr>
+            <a:r>
+              <a:rPr lang="en-GB" sz="2200" b="1" dirty="0" smtClean="0">
+                <a:solidFill>
+                  <a:schemeClr val="tx2"/>
+                </a:solidFill>
+              </a:rPr>
+              <a:t>Pacman – Ghosts activate on sight</a:t>
+            </a:r>
+            <a:endParaRPr lang="en-GB" sz="2200" b="1" dirty="0">
+              <a:solidFill>
+                <a:schemeClr val="tx2"/>
+              </a:solidFill>
+            </a:endParaRPr>
+          </a:p>
+        </p:txBody>
+      </p:sp>
+      <p:sp>
+        <p:nvSpPr>
+          <p:cNvPr id="3075" name="Rectangle 3"/>
+          <p:cNvSpPr>
+            <a:spLocks noChangeArrowheads="1"/>
+          </p:cNvSpPr>
+          <p:nvPr/>
+        </p:nvSpPr>
+        <p:spPr bwMode="auto">
           <a:xfrm>
-            <a:off x="400050" y="2503487"/>
-            <a:ext cx="8370887" cy="620713"/>
+            <a:off x="396875" y="2349500"/>
+            <a:ext cx="8370888" cy="620713"/>
           </a:xfrm>
+          <a:prstGeom prst="rect">
+            <a:avLst/>
+          </a:prstGeom>
+          <a:noFill/>
+          <a:ln w="9525">
+            <a:noFill/>
+            <a:miter lim="800000"/>
+            <a:headEnd/>
+            <a:tailEnd/>
+          </a:ln>
         </p:spPr>
         <p:txBody>
-          <a:bodyPr/>
+          <a:bodyPr lIns="0" tIns="0" rIns="0" bIns="0"/>
           <a:lstStyle/>
           <a:p>
-            <a:pPr marL="0" indent="0">
-              <a:buNone/>
-            </a:pPr>
-            <a:endParaRPr lang="de-DE" sz="1800" noProof="0" dirty="0"/>
+            <a:r>
+              <a:rPr lang="en-GB" sz="1600" b="1" dirty="0" smtClean="0">
+                <a:solidFill>
+                  <a:srgbClr val="000000"/>
+                </a:solidFill>
+              </a:rPr>
+              <a:t>Mao L., Wang C., Sebastian G.</a:t>
+            </a:r>
+            <a:endParaRPr lang="en-GB" sz="1600" b="1" dirty="0" smtClean="0">
+              <a:solidFill>
+                <a:srgbClr val="000000"/>
+              </a:solidFill>
+            </a:endParaRPr>
           </a:p>
         </p:txBody>
       </p:sp>
@@ -4548,7 +4320,7 @@
       </p:grpSpPr>
       <p:sp>
         <p:nvSpPr>
-          <p:cNvPr id="2" name="Titel 1"/>
+          <p:cNvPr id="2" name="Title 1"/>
           <p:cNvSpPr>
             <a:spLocks noGrp="1"/>
           </p:cNvSpPr>
@@ -4561,18 +4333,786 @@
           <a:bodyPr/>
           <a:lstStyle/>
           <a:p>
-            <a:endParaRPr lang="en-GB"/>
-          </a:p>
-        </p:txBody>
-      </p:sp>
-      <p:sp>
-        <p:nvSpPr>
-          <p:cNvPr id="3" name="Inhaltsplatzhalter 2"/>
+            <a:r>
+              <a:rPr lang="en-GB" dirty="0" smtClean="0"/>
+              <a:t>Problem specification</a:t>
+            </a:r>
+            <a:endParaRPr lang="en-GB" dirty="0" smtClean="0"/>
+          </a:p>
+        </p:txBody>
+      </p:sp>
+      <mc:AlternateContent xmlns:mc="http://schemas.openxmlformats.org/markup-compatibility/2006">
+        <mc:Choice xmlns:a14="http://schemas.microsoft.com/office/drawing/2010/main" Requires="a14">
+          <p:sp>
+            <p:nvSpPr>
+              <p:cNvPr id="3" name="Content Placeholder 2"/>
+              <p:cNvSpPr>
+                <a:spLocks noGrp="1"/>
+              </p:cNvSpPr>
+              <p:nvPr>
+                <p:ph idx="1"/>
+              </p:nvPr>
+            </p:nvSpPr>
+            <p:spPr/>
+            <p:txBody>
+              <a:bodyPr>
+                <a:normAutofit fontScale="92500" lnSpcReduction="10000"/>
+              </a:bodyPr>
+              <a:lstStyle/>
+              <a:p>
+                <a:r>
+                  <a:rPr lang="en-US" b="1" dirty="0" smtClean="0"/>
+                  <a:t>Given</a:t>
+                </a:r>
+              </a:p>
+              <a:p>
+                <a:pPr lvl="1"/>
+                <a:r>
+                  <a:rPr lang="en-US" dirty="0" smtClean="0"/>
+                  <a:t>A </a:t>
+                </a:r>
+                <a:r>
+                  <a:rPr lang="en-US" dirty="0"/>
+                  <a:t>graph </a:t>
+                </a:r>
+                <a14:m>
+                  <m:oMath xmlns:m="http://schemas.openxmlformats.org/officeDocument/2006/math">
+                    <m:r>
+                      <a:rPr lang="de-DE" b="0" i="1" smtClean="0">
+                        <a:latin typeface="Cambria Math" panose="02040503050406030204" pitchFamily="18" charset="0"/>
+                      </a:rPr>
+                      <m:t>𝐺</m:t>
+                    </m:r>
+                    <m:r>
+                      <a:rPr lang="de-DE" b="0" i="1" smtClean="0">
+                        <a:latin typeface="Cambria Math" panose="02040503050406030204" pitchFamily="18" charset="0"/>
+                      </a:rPr>
+                      <m:t>=(</m:t>
+                    </m:r>
+                    <m:r>
+                      <a:rPr lang="de-DE" b="0" i="1" smtClean="0">
+                        <a:latin typeface="Cambria Math" panose="02040503050406030204" pitchFamily="18" charset="0"/>
+                      </a:rPr>
+                      <m:t>𝑉</m:t>
+                    </m:r>
+                    <m:r>
+                      <a:rPr lang="de-DE" b="0" i="1" smtClean="0">
+                        <a:latin typeface="Cambria Math" panose="02040503050406030204" pitchFamily="18" charset="0"/>
+                      </a:rPr>
+                      <m:t>, </m:t>
+                    </m:r>
+                    <m:r>
+                      <a:rPr lang="de-DE" b="0" i="1" smtClean="0">
+                        <a:latin typeface="Cambria Math" panose="02040503050406030204" pitchFamily="18" charset="0"/>
+                      </a:rPr>
+                      <m:t>𝐸</m:t>
+                    </m:r>
+                    <m:r>
+                      <a:rPr lang="de-DE" b="0" i="1" smtClean="0">
+                        <a:latin typeface="Cambria Math" panose="02040503050406030204" pitchFamily="18" charset="0"/>
+                      </a:rPr>
+                      <m:t>)</m:t>
+                    </m:r>
+                  </m:oMath>
+                </a14:m>
+                <a:r>
+                  <a:rPr lang="en-US" dirty="0" smtClean="0"/>
+                  <a:t> describing </a:t>
+                </a:r>
+                <a:r>
+                  <a:rPr lang="en-US" dirty="0"/>
+                  <a:t>a landscape with obstacles modeled </a:t>
+                </a:r>
+                <a:r>
+                  <a:rPr lang="en-US" dirty="0" smtClean="0"/>
+                  <a:t>through</a:t>
+                </a:r>
+              </a:p>
+              <a:p>
+                <a:pPr lvl="1"/>
+                <a:r>
+                  <a:rPr lang="en-US" dirty="0" smtClean="0"/>
+                  <a:t>simple </a:t>
+                </a:r>
+                <a:r>
+                  <a:rPr lang="en-US" dirty="0"/>
+                  <a:t>polygons with </a:t>
+                </a:r>
+                <a14:m>
+                  <m:oMath xmlns:m="http://schemas.openxmlformats.org/officeDocument/2006/math">
+                    <m:r>
+                      <a:rPr lang="de-DE" b="0" i="1" smtClean="0">
+                        <a:latin typeface="Cambria Math" panose="02040503050406030204" pitchFamily="18" charset="0"/>
+                      </a:rPr>
+                      <m:t>𝑛</m:t>
+                    </m:r>
+                  </m:oMath>
+                </a14:m>
+                <a:r>
+                  <a:rPr lang="en-US" dirty="0"/>
+                  <a:t> vertices in </a:t>
+                </a:r>
+                <a:r>
+                  <a:rPr lang="en-US" dirty="0" smtClean="0"/>
+                  <a:t>total</a:t>
+                </a:r>
+              </a:p>
+              <a:p>
+                <a:pPr lvl="1"/>
+                <a:r>
+                  <a:rPr lang="en-US" dirty="0" smtClean="0"/>
+                  <a:t>A </a:t>
+                </a:r>
+                <a:r>
+                  <a:rPr lang="en-US" dirty="0"/>
+                  <a:t>straight-line drawing of the landscape </a:t>
+                </a:r>
+                <a14:m>
+                  <m:oMath xmlns:m="http://schemas.openxmlformats.org/officeDocument/2006/math">
+                    <m:r>
+                      <m:rPr>
+                        <m:sty m:val="p"/>
+                      </m:rPr>
+                      <a:rPr lang="el-GR" i="1" smtClean="0">
+                        <a:latin typeface="Cambria Math" panose="02040503050406030204" pitchFamily="18" charset="0"/>
+                        <a:ea typeface="Cambria Math" panose="02040503050406030204" pitchFamily="18" charset="0"/>
+                      </a:rPr>
+                      <m:t>Γ</m:t>
+                    </m:r>
+                    <m:r>
+                      <a:rPr lang="de-DE" b="0" i="1" smtClean="0">
+                        <a:latin typeface="Cambria Math" panose="02040503050406030204" pitchFamily="18" charset="0"/>
+                        <a:ea typeface="Cambria Math" panose="02040503050406030204" pitchFamily="18" charset="0"/>
+                      </a:rPr>
+                      <m:t>:</m:t>
+                    </m:r>
+                    <m:r>
+                      <a:rPr lang="de-DE" b="0" i="1" smtClean="0">
+                        <a:latin typeface="Cambria Math" panose="02040503050406030204" pitchFamily="18" charset="0"/>
+                        <a:ea typeface="Cambria Math" panose="02040503050406030204" pitchFamily="18" charset="0"/>
+                      </a:rPr>
+                      <m:t>𝑉</m:t>
+                    </m:r>
+                    <m:r>
+                      <a:rPr lang="de-DE" b="0" i="1" smtClean="0">
+                        <a:latin typeface="Cambria Math" panose="02040503050406030204" pitchFamily="18" charset="0"/>
+                        <a:ea typeface="Cambria Math" panose="02040503050406030204" pitchFamily="18" charset="0"/>
+                      </a:rPr>
+                      <m:t>→</m:t>
+                    </m:r>
+                    <m:sSup>
+                      <m:sSupPr>
+                        <m:ctrlPr>
+                          <a:rPr lang="de-DE" b="0" i="1" smtClean="0">
+                            <a:latin typeface="Cambria Math" panose="02040503050406030204" pitchFamily="18" charset="0"/>
+                            <a:ea typeface="Cambria Math" panose="02040503050406030204" pitchFamily="18" charset="0"/>
+                          </a:rPr>
+                        </m:ctrlPr>
+                      </m:sSupPr>
+                      <m:e>
+                        <m:r>
+                          <a:rPr lang="de-DE" b="0" i="1" smtClean="0">
+                            <a:latin typeface="Cambria Math" panose="02040503050406030204" pitchFamily="18" charset="0"/>
+                            <a:ea typeface="Cambria Math" panose="02040503050406030204" pitchFamily="18" charset="0"/>
+                          </a:rPr>
+                          <m:t>𝑅</m:t>
+                        </m:r>
+                      </m:e>
+                      <m:sup>
+                        <m:r>
+                          <a:rPr lang="de-DE" b="0" i="1" smtClean="0">
+                            <a:latin typeface="Cambria Math" panose="02040503050406030204" pitchFamily="18" charset="0"/>
+                            <a:ea typeface="Cambria Math" panose="02040503050406030204" pitchFamily="18" charset="0"/>
+                          </a:rPr>
+                          <m:t>2</m:t>
+                        </m:r>
+                      </m:sup>
+                    </m:sSup>
+                  </m:oMath>
+                </a14:m>
+                <a:endParaRPr lang="de-DE" b="0" dirty="0" smtClean="0">
+                  <a:ea typeface="Cambria Math" panose="02040503050406030204" pitchFamily="18" charset="0"/>
+                </a:endParaRPr>
+              </a:p>
+              <a:p>
+                <a:pPr lvl="1"/>
+                <a:r>
+                  <a:rPr lang="en-US" dirty="0" smtClean="0"/>
+                  <a:t>The </a:t>
+                </a:r>
+                <a:r>
+                  <a:rPr lang="en-US" dirty="0"/>
+                  <a:t>position </a:t>
+                </a:r>
+                <a14:m>
+                  <m:oMath xmlns:m="http://schemas.openxmlformats.org/officeDocument/2006/math">
+                    <m:r>
+                      <a:rPr lang="de-DE" b="0" i="1" smtClean="0">
+                        <a:latin typeface="Cambria Math" panose="02040503050406030204" pitchFamily="18" charset="0"/>
+                      </a:rPr>
+                      <m:t>𝑃</m:t>
+                    </m:r>
+                    <m:r>
+                      <a:rPr lang="de-DE" b="0" i="1" smtClean="0">
+                        <a:latin typeface="Cambria Math" panose="02040503050406030204" pitchFamily="18" charset="0"/>
+                        <a:ea typeface="Cambria Math" panose="02040503050406030204" pitchFamily="18" charset="0"/>
+                      </a:rPr>
+                      <m:t>∈</m:t>
+                    </m:r>
+                    <m:sSup>
+                      <m:sSupPr>
+                        <m:ctrlPr>
+                          <a:rPr lang="de-DE" b="0" i="1" smtClean="0">
+                            <a:latin typeface="Cambria Math" panose="02040503050406030204" pitchFamily="18" charset="0"/>
+                            <a:ea typeface="Cambria Math" panose="02040503050406030204" pitchFamily="18" charset="0"/>
+                          </a:rPr>
+                        </m:ctrlPr>
+                      </m:sSupPr>
+                      <m:e>
+                        <m:r>
+                          <a:rPr lang="de-DE" b="0" i="1" smtClean="0">
+                            <a:latin typeface="Cambria Math" panose="02040503050406030204" pitchFamily="18" charset="0"/>
+                            <a:ea typeface="Cambria Math" panose="02040503050406030204" pitchFamily="18" charset="0"/>
+                          </a:rPr>
+                          <m:t>𝑅</m:t>
+                        </m:r>
+                      </m:e>
+                      <m:sup>
+                        <m:r>
+                          <a:rPr lang="de-DE" b="0" i="1" smtClean="0">
+                            <a:latin typeface="Cambria Math" panose="02040503050406030204" pitchFamily="18" charset="0"/>
+                            <a:ea typeface="Cambria Math" panose="02040503050406030204" pitchFamily="18" charset="0"/>
+                          </a:rPr>
+                          <m:t>2</m:t>
+                        </m:r>
+                      </m:sup>
+                    </m:sSup>
+                  </m:oMath>
+                </a14:m>
+                <a:r>
+                  <a:rPr lang="en-US" dirty="0"/>
+                  <a:t> </a:t>
+                </a:r>
+                <a:r>
+                  <a:rPr lang="en-US" dirty="0" smtClean="0"/>
+                  <a:t>(Pacman)</a:t>
+                </a:r>
+              </a:p>
+              <a:p>
+                <a:pPr lvl="1"/>
+                <a:r>
+                  <a:rPr lang="en-US" dirty="0" smtClean="0"/>
+                  <a:t>The </a:t>
+                </a:r>
+                <a:r>
+                  <a:rPr lang="en-US" dirty="0"/>
+                  <a:t>positions </a:t>
+                </a:r>
+                <a14:m>
+                  <m:oMath xmlns:m="http://schemas.openxmlformats.org/officeDocument/2006/math">
+                    <m:sSub>
+                      <m:sSubPr>
+                        <m:ctrlPr>
+                          <a:rPr lang="de-DE" i="1" smtClean="0">
+                            <a:latin typeface="Cambria Math" panose="02040503050406030204" pitchFamily="18" charset="0"/>
+                            <a:ea typeface="Cambria Math" panose="02040503050406030204" pitchFamily="18" charset="0"/>
+                          </a:rPr>
+                        </m:ctrlPr>
+                      </m:sSubPr>
+                      <m:e>
+                        <m:sSub>
+                          <m:sSubPr>
+                            <m:ctrlPr>
+                              <a:rPr lang="de-DE" i="1">
+                                <a:latin typeface="Cambria Math" panose="02040503050406030204" pitchFamily="18" charset="0"/>
+                                <a:ea typeface="Cambria Math" panose="02040503050406030204" pitchFamily="18" charset="0"/>
+                              </a:rPr>
+                            </m:ctrlPr>
+                          </m:sSubPr>
+                          <m:e>
+                            <m:r>
+                              <a:rPr lang="de-DE" i="1">
+                                <a:latin typeface="Cambria Math" panose="02040503050406030204" pitchFamily="18" charset="0"/>
+                                <a:ea typeface="Cambria Math" panose="02040503050406030204" pitchFamily="18" charset="0"/>
+                              </a:rPr>
+                              <m:t>(</m:t>
+                            </m:r>
+                            <m:r>
+                              <a:rPr lang="de-DE" i="1" smtClean="0">
+                                <a:latin typeface="Cambria Math" panose="02040503050406030204" pitchFamily="18" charset="0"/>
+                                <a:ea typeface="Cambria Math" panose="02040503050406030204" pitchFamily="18" charset="0"/>
+                              </a:rPr>
+                              <m:t>𝑄</m:t>
+                            </m:r>
+                          </m:e>
+                          <m:sub>
+                            <m:r>
+                              <a:rPr lang="de-DE" i="1">
+                                <a:latin typeface="Cambria Math" panose="02040503050406030204" pitchFamily="18" charset="0"/>
+                                <a:ea typeface="Cambria Math" panose="02040503050406030204" pitchFamily="18" charset="0"/>
+                              </a:rPr>
+                              <m:t>𝑖</m:t>
+                            </m:r>
+                          </m:sub>
+                        </m:sSub>
+                        <m:r>
+                          <a:rPr lang="de-DE" i="1">
+                            <a:latin typeface="Cambria Math" panose="02040503050406030204" pitchFamily="18" charset="0"/>
+                            <a:ea typeface="Cambria Math" panose="02040503050406030204" pitchFamily="18" charset="0"/>
+                          </a:rPr>
+                          <m:t>∈</m:t>
+                        </m:r>
+                        <m:sSup>
+                          <m:sSupPr>
+                            <m:ctrlPr>
+                              <a:rPr lang="de-DE" i="1">
+                                <a:latin typeface="Cambria Math" panose="02040503050406030204" pitchFamily="18" charset="0"/>
+                                <a:ea typeface="Cambria Math" panose="02040503050406030204" pitchFamily="18" charset="0"/>
+                              </a:rPr>
+                            </m:ctrlPr>
+                          </m:sSupPr>
+                          <m:e>
+                            <m:r>
+                              <a:rPr lang="de-DE" i="1">
+                                <a:latin typeface="Cambria Math" panose="02040503050406030204" pitchFamily="18" charset="0"/>
+                                <a:ea typeface="Cambria Math" panose="02040503050406030204" pitchFamily="18" charset="0"/>
+                              </a:rPr>
+                              <m:t>𝑅</m:t>
+                            </m:r>
+                          </m:e>
+                          <m:sup>
+                            <m:r>
+                              <a:rPr lang="de-DE" i="1">
+                                <a:latin typeface="Cambria Math" panose="02040503050406030204" pitchFamily="18" charset="0"/>
+                                <a:ea typeface="Cambria Math" panose="02040503050406030204" pitchFamily="18" charset="0"/>
+                              </a:rPr>
+                              <m:t>2</m:t>
+                            </m:r>
+                          </m:sup>
+                        </m:sSup>
+                        <m:r>
+                          <a:rPr lang="de-DE" i="1">
+                            <a:latin typeface="Cambria Math" panose="02040503050406030204" pitchFamily="18" charset="0"/>
+                            <a:ea typeface="Cambria Math" panose="02040503050406030204" pitchFamily="18" charset="0"/>
+                          </a:rPr>
+                          <m:t>)</m:t>
+                        </m:r>
+                      </m:e>
+                      <m:sub>
+                        <m:r>
+                          <a:rPr lang="de-DE" b="0" i="1" smtClean="0">
+                            <a:latin typeface="Cambria Math" panose="02040503050406030204" pitchFamily="18" charset="0"/>
+                            <a:ea typeface="Cambria Math" panose="02040503050406030204" pitchFamily="18" charset="0"/>
+                          </a:rPr>
+                          <m:t>𝑖</m:t>
+                        </m:r>
+                        <m:r>
+                          <a:rPr lang="de-DE" b="0" i="1" smtClean="0">
+                            <a:latin typeface="Cambria Math" panose="02040503050406030204" pitchFamily="18" charset="0"/>
+                            <a:ea typeface="Cambria Math" panose="02040503050406030204" pitchFamily="18" charset="0"/>
+                          </a:rPr>
+                          <m:t>∈{1,…,</m:t>
+                        </m:r>
+                        <m:r>
+                          <a:rPr lang="de-DE" b="0" i="1" smtClean="0">
+                            <a:latin typeface="Cambria Math" panose="02040503050406030204" pitchFamily="18" charset="0"/>
+                            <a:ea typeface="Cambria Math" panose="02040503050406030204" pitchFamily="18" charset="0"/>
+                          </a:rPr>
+                          <m:t>𝑚</m:t>
+                        </m:r>
+                        <m:r>
+                          <a:rPr lang="de-DE" b="0" i="1" smtClean="0">
+                            <a:latin typeface="Cambria Math" panose="02040503050406030204" pitchFamily="18" charset="0"/>
+                            <a:ea typeface="Cambria Math" panose="02040503050406030204" pitchFamily="18" charset="0"/>
+                          </a:rPr>
+                          <m:t>}</m:t>
+                        </m:r>
+                      </m:sub>
+                    </m:sSub>
+                  </m:oMath>
+                </a14:m>
+                <a:r>
+                  <a:rPr lang="en-US" dirty="0" smtClean="0"/>
+                  <a:t> </a:t>
+                </a:r>
+                <a:r>
+                  <a:rPr lang="en-US" dirty="0"/>
+                  <a:t>of</a:t>
+                </a:r>
+                <a14:m>
+                  <m:oMath xmlns:m="http://schemas.openxmlformats.org/officeDocument/2006/math">
+                    <m:r>
+                      <a:rPr lang="de-DE" b="0" i="0" smtClean="0">
+                        <a:latin typeface="Cambria Math" panose="02040503050406030204" pitchFamily="18" charset="0"/>
+                        <a:ea typeface="Cambria Math" panose="02040503050406030204" pitchFamily="18" charset="0"/>
+                      </a:rPr>
+                      <m:t> </m:t>
+                    </m:r>
+                    <m:r>
+                      <a:rPr lang="de-DE" i="1">
+                        <a:latin typeface="Cambria Math" panose="02040503050406030204" pitchFamily="18" charset="0"/>
+                        <a:ea typeface="Cambria Math" panose="02040503050406030204" pitchFamily="18" charset="0"/>
+                      </a:rPr>
+                      <m:t>𝑚</m:t>
+                    </m:r>
+                    <m:r>
+                      <a:rPr lang="de-DE" i="1">
+                        <a:latin typeface="Cambria Math" panose="02040503050406030204" pitchFamily="18" charset="0"/>
+                        <a:ea typeface="Cambria Math" panose="02040503050406030204" pitchFamily="18" charset="0"/>
+                      </a:rPr>
+                      <m:t> </m:t>
+                    </m:r>
+                  </m:oMath>
+                </a14:m>
+                <a:r>
+                  <a:rPr lang="en-US" dirty="0" smtClean="0"/>
+                  <a:t>ghosts</a:t>
+                </a:r>
+              </a:p>
+              <a:p>
+                <a:r>
+                  <a:rPr lang="en-US" b="1" dirty="0" smtClean="0"/>
+                  <a:t>Problem</a:t>
+                </a:r>
+              </a:p>
+              <a:p>
+                <a:pPr lvl="1"/>
+                <a:r>
+                  <a:rPr lang="en-US" dirty="0" smtClean="0"/>
+                  <a:t>Find </a:t>
+                </a:r>
+                <a:r>
+                  <a:rPr lang="en-US" dirty="0"/>
+                  <a:t>an efficient way to determine if </a:t>
+                </a:r>
+                <a14:m>
+                  <m:oMath xmlns:m="http://schemas.openxmlformats.org/officeDocument/2006/math">
+                    <m:r>
+                      <a:rPr lang="de-DE" i="1">
+                        <a:latin typeface="Cambria Math" panose="02040503050406030204" pitchFamily="18" charset="0"/>
+                      </a:rPr>
+                      <m:t>𝑃</m:t>
+                    </m:r>
+                    <m:r>
+                      <a:rPr lang="de-DE" i="1">
+                        <a:latin typeface="Cambria Math" panose="02040503050406030204" pitchFamily="18" charset="0"/>
+                      </a:rPr>
+                      <m:t> </m:t>
+                    </m:r>
+                  </m:oMath>
+                </a14:m>
+                <a:r>
+                  <a:rPr lang="en-US" dirty="0" smtClean="0"/>
+                  <a:t>is </a:t>
+                </a:r>
+                <a:r>
+                  <a:rPr lang="en-US" i="1" dirty="0"/>
+                  <a:t>visible</a:t>
+                </a:r>
+                <a:r>
+                  <a:rPr lang="en-US" dirty="0"/>
+                  <a:t> </a:t>
+                </a:r>
+                <a:r>
+                  <a:rPr lang="en-US" dirty="0" smtClean="0"/>
+                  <a:t>from </a:t>
+                </a:r>
+                <a14:m>
+                  <m:oMath xmlns:m="http://schemas.openxmlformats.org/officeDocument/2006/math">
+                    <m:sSub>
+                      <m:sSubPr>
+                        <m:ctrlPr>
+                          <a:rPr lang="de-DE" i="1">
+                            <a:latin typeface="Cambria Math" panose="02040503050406030204" pitchFamily="18" charset="0"/>
+                            <a:ea typeface="Cambria Math" panose="02040503050406030204" pitchFamily="18" charset="0"/>
+                          </a:rPr>
+                        </m:ctrlPr>
+                      </m:sSubPr>
+                      <m:e>
+                        <m:r>
+                          <a:rPr lang="de-DE" i="1">
+                            <a:latin typeface="Cambria Math" panose="02040503050406030204" pitchFamily="18" charset="0"/>
+                            <a:ea typeface="Cambria Math" panose="02040503050406030204" pitchFamily="18" charset="0"/>
+                          </a:rPr>
+                          <m:t>𝑄</m:t>
+                        </m:r>
+                      </m:e>
+                      <m:sub>
+                        <m:r>
+                          <a:rPr lang="de-DE" i="1">
+                            <a:latin typeface="Cambria Math" panose="02040503050406030204" pitchFamily="18" charset="0"/>
+                            <a:ea typeface="Cambria Math" panose="02040503050406030204" pitchFamily="18" charset="0"/>
+                          </a:rPr>
+                          <m:t>𝑖</m:t>
+                        </m:r>
+                      </m:sub>
+                    </m:sSub>
+                  </m:oMath>
+                </a14:m>
+                <a:r>
+                  <a:rPr lang="en-US" dirty="0" smtClean="0"/>
+                  <a:t> for each </a:t>
+                </a:r>
+                <a14:m>
+                  <m:oMath xmlns:m="http://schemas.openxmlformats.org/officeDocument/2006/math">
+                    <m:r>
+                      <a:rPr lang="de-DE" i="1">
+                        <a:latin typeface="Cambria Math" panose="02040503050406030204" pitchFamily="18" charset="0"/>
+                        <a:ea typeface="Cambria Math" panose="02040503050406030204" pitchFamily="18" charset="0"/>
+                      </a:rPr>
+                      <m:t>𝑖</m:t>
+                    </m:r>
+                    <m:r>
+                      <a:rPr lang="de-DE" i="1">
+                        <a:latin typeface="Cambria Math" panose="02040503050406030204" pitchFamily="18" charset="0"/>
+                        <a:ea typeface="Cambria Math" panose="02040503050406030204" pitchFamily="18" charset="0"/>
+                      </a:rPr>
+                      <m:t>∈{1,…,</m:t>
+                    </m:r>
+                    <m:r>
+                      <a:rPr lang="de-DE" i="1">
+                        <a:latin typeface="Cambria Math" panose="02040503050406030204" pitchFamily="18" charset="0"/>
+                        <a:ea typeface="Cambria Math" panose="02040503050406030204" pitchFamily="18" charset="0"/>
+                      </a:rPr>
+                      <m:t>𝑚</m:t>
+                    </m:r>
+                    <m:r>
+                      <a:rPr lang="de-DE" i="1">
+                        <a:latin typeface="Cambria Math" panose="02040503050406030204" pitchFamily="18" charset="0"/>
+                        <a:ea typeface="Cambria Math" panose="02040503050406030204" pitchFamily="18" charset="0"/>
+                      </a:rPr>
+                      <m:t>}</m:t>
+                    </m:r>
+                  </m:oMath>
+                </a14:m>
+                <a:endParaRPr lang="en-US" dirty="0"/>
+              </a:p>
+              <a:p>
+                <a:r>
+                  <a:rPr lang="en-US" dirty="0"/>
+                  <a:t>For positions</a:t>
+                </a:r>
+                <a:r>
+                  <a:rPr lang="en-US" dirty="0" smtClean="0"/>
+                  <a:t> </a:t>
+                </a:r>
+                <a14:m>
+                  <m:oMath xmlns:m="http://schemas.openxmlformats.org/officeDocument/2006/math">
+                    <m:r>
+                      <a:rPr lang="de-DE" b="0" i="1" smtClean="0">
+                        <a:latin typeface="Cambria Math" panose="02040503050406030204" pitchFamily="18" charset="0"/>
+                        <a:ea typeface="Cambria Math" panose="02040503050406030204" pitchFamily="18" charset="0"/>
+                      </a:rPr>
+                      <m:t>𝐴</m:t>
+                    </m:r>
+                    <m:r>
+                      <a:rPr lang="de-DE" b="0" i="1" smtClean="0">
+                        <a:latin typeface="Cambria Math" panose="02040503050406030204" pitchFamily="18" charset="0"/>
+                        <a:ea typeface="Cambria Math" panose="02040503050406030204" pitchFamily="18" charset="0"/>
+                      </a:rPr>
+                      <m:t>,</m:t>
+                    </m:r>
+                    <m:r>
+                      <a:rPr lang="de-DE" b="0" i="1" smtClean="0">
+                        <a:latin typeface="Cambria Math" panose="02040503050406030204" pitchFamily="18" charset="0"/>
+                        <a:ea typeface="Cambria Math" panose="02040503050406030204" pitchFamily="18" charset="0"/>
+                      </a:rPr>
+                      <m:t>𝐵</m:t>
+                    </m:r>
+                    <m:r>
+                      <a:rPr lang="de-DE" i="1">
+                        <a:latin typeface="Cambria Math" panose="02040503050406030204" pitchFamily="18" charset="0"/>
+                        <a:ea typeface="Cambria Math" panose="02040503050406030204" pitchFamily="18" charset="0"/>
+                      </a:rPr>
+                      <m:t>∈</m:t>
+                    </m:r>
+                    <m:sSup>
+                      <m:sSupPr>
+                        <m:ctrlPr>
+                          <a:rPr lang="de-DE" i="1">
+                            <a:latin typeface="Cambria Math" panose="02040503050406030204" pitchFamily="18" charset="0"/>
+                            <a:ea typeface="Cambria Math" panose="02040503050406030204" pitchFamily="18" charset="0"/>
+                          </a:rPr>
+                        </m:ctrlPr>
+                      </m:sSupPr>
+                      <m:e>
+                        <m:r>
+                          <a:rPr lang="de-DE" i="1">
+                            <a:latin typeface="Cambria Math" panose="02040503050406030204" pitchFamily="18" charset="0"/>
+                            <a:ea typeface="Cambria Math" panose="02040503050406030204" pitchFamily="18" charset="0"/>
+                          </a:rPr>
+                          <m:t>𝑅</m:t>
+                        </m:r>
+                      </m:e>
+                      <m:sup>
+                        <m:r>
+                          <a:rPr lang="de-DE" i="1">
+                            <a:latin typeface="Cambria Math" panose="02040503050406030204" pitchFamily="18" charset="0"/>
+                            <a:ea typeface="Cambria Math" panose="02040503050406030204" pitchFamily="18" charset="0"/>
+                          </a:rPr>
+                          <m:t>2</m:t>
+                        </m:r>
+                      </m:sup>
+                    </m:sSup>
+                  </m:oMath>
+                </a14:m>
+                <a:r>
+                  <a:rPr lang="en-US" dirty="0" smtClean="0"/>
+                  <a:t>, </a:t>
+                </a:r>
+                <a14:m>
+                  <m:oMath xmlns:m="http://schemas.openxmlformats.org/officeDocument/2006/math">
+                    <m:r>
+                      <a:rPr lang="de-DE" i="1">
+                        <a:latin typeface="Cambria Math" panose="02040503050406030204" pitchFamily="18" charset="0"/>
+                        <a:ea typeface="Cambria Math" panose="02040503050406030204" pitchFamily="18" charset="0"/>
+                      </a:rPr>
+                      <m:t>𝐴</m:t>
+                    </m:r>
+                  </m:oMath>
+                </a14:m>
+                <a:r>
+                  <a:rPr lang="en-US" dirty="0" smtClean="0"/>
+                  <a:t> </a:t>
+                </a:r>
+                <a:r>
+                  <a:rPr lang="en-US" dirty="0"/>
+                  <a:t>is </a:t>
+                </a:r>
+                <a:r>
+                  <a:rPr lang="en-US" i="1" dirty="0"/>
+                  <a:t>visible</a:t>
+                </a:r>
+                <a:r>
+                  <a:rPr lang="en-US" dirty="0"/>
+                  <a:t> from </a:t>
+                </a:r>
+                <a14:m>
+                  <m:oMath xmlns:m="http://schemas.openxmlformats.org/officeDocument/2006/math">
+                    <m:r>
+                      <a:rPr lang="de-DE" b="0" i="1" smtClean="0">
+                        <a:latin typeface="Cambria Math" panose="02040503050406030204" pitchFamily="18" charset="0"/>
+                      </a:rPr>
+                      <m:t>𝐵</m:t>
+                    </m:r>
+                  </m:oMath>
+                </a14:m>
+                <a:r>
+                  <a:rPr lang="en-US" dirty="0" smtClean="0"/>
+                  <a:t> </a:t>
+                </a:r>
+                <a:r>
+                  <a:rPr lang="en-US" dirty="0" err="1"/>
+                  <a:t>iff</a:t>
+                </a:r>
+                <a:r>
+                  <a:rPr lang="en-US" dirty="0"/>
+                  <a:t> </a:t>
+                </a:r>
+                <a:r>
+                  <a:rPr lang="en-US" dirty="0" smtClean="0"/>
+                  <a:t>the segment </a:t>
+                </a:r>
+                <a14:m>
+                  <m:oMath xmlns:m="http://schemas.openxmlformats.org/officeDocument/2006/math">
+                    <m:bar>
+                      <m:barPr>
+                        <m:pos m:val="top"/>
+                        <m:ctrlPr>
+                          <a:rPr lang="de-DE" i="1" smtClean="0">
+                            <a:latin typeface="Cambria Math" panose="02040503050406030204" pitchFamily="18" charset="0"/>
+                            <a:ea typeface="Cambria Math" panose="02040503050406030204" pitchFamily="18" charset="0"/>
+                          </a:rPr>
+                        </m:ctrlPr>
+                      </m:barPr>
+                      <m:e>
+                        <m:r>
+                          <a:rPr lang="de-DE" i="1" smtClean="0">
+                            <a:latin typeface="Cambria Math" panose="02040503050406030204" pitchFamily="18" charset="0"/>
+                            <a:ea typeface="Cambria Math" panose="02040503050406030204" pitchFamily="18" charset="0"/>
+                          </a:rPr>
+                          <m:t>𝐴</m:t>
+                        </m:r>
+                        <m:r>
+                          <a:rPr lang="de-DE" b="0" i="1" smtClean="0">
+                            <a:latin typeface="Cambria Math" panose="02040503050406030204" pitchFamily="18" charset="0"/>
+                            <a:ea typeface="Cambria Math" panose="02040503050406030204" pitchFamily="18" charset="0"/>
+                          </a:rPr>
+                          <m:t>𝐵</m:t>
+                        </m:r>
+                      </m:e>
+                    </m:bar>
+                  </m:oMath>
+                </a14:m>
+                <a:r>
+                  <a:rPr lang="en-US" dirty="0" smtClean="0"/>
+                  <a:t> </a:t>
+                </a:r>
+                <a:r>
+                  <a:rPr lang="en-US" dirty="0"/>
+                  <a:t>has no intersection with any polygon in </a:t>
+                </a:r>
+                <a14:m>
+                  <m:oMath xmlns:m="http://schemas.openxmlformats.org/officeDocument/2006/math">
+                    <m:r>
+                      <m:rPr>
+                        <m:sty m:val="p"/>
+                      </m:rPr>
+                      <a:rPr lang="el-GR" i="1" smtClean="0">
+                        <a:latin typeface="Cambria Math" panose="02040503050406030204" pitchFamily="18" charset="0"/>
+                        <a:ea typeface="Cambria Math" panose="02040503050406030204" pitchFamily="18" charset="0"/>
+                      </a:rPr>
+                      <m:t>Γ</m:t>
+                    </m:r>
+                  </m:oMath>
+                </a14:m>
+                <a:endParaRPr lang="en-GB" dirty="0" smtClean="0"/>
+              </a:p>
+            </p:txBody>
+          </p:sp>
+        </mc:Choice>
+        <mc:Fallback>
+          <p:sp>
+            <p:nvSpPr>
+              <p:cNvPr id="3" name="Content Placeholder 2"/>
+              <p:cNvSpPr>
+                <a:spLocks noGrp="1" noRot="1" noChangeAspect="1" noMove="1" noResize="1" noEditPoints="1" noAdjustHandles="1" noChangeArrowheads="1" noChangeShapeType="1" noTextEdit="1"/>
+              </p:cNvSpPr>
+              <p:nvPr>
+                <p:ph idx="1"/>
+              </p:nvPr>
+            </p:nvSpPr>
+            <p:spPr>
+              <a:blipFill>
+                <a:blip r:embed="rId3"/>
+                <a:stretch>
+                  <a:fillRect t="-3105" b="-2458"/>
+                </a:stretch>
+              </a:blipFill>
+            </p:spPr>
+            <p:txBody>
+              <a:bodyPr/>
+              <a:lstStyle/>
+              <a:p>
+                <a:r>
+                  <a:rPr lang="de-DE">
+                    <a:noFill/>
+                  </a:rPr>
+                  <a:t> </a:t>
+                </a:r>
+              </a:p>
+            </p:txBody>
+          </p:sp>
+        </mc:Fallback>
+      </mc:AlternateContent>
+      <p:sp>
+        <p:nvSpPr>
+          <p:cNvPr id="6" name="Footer Placeholder 5"/>
           <p:cNvSpPr>
             <a:spLocks noGrp="1"/>
           </p:cNvSpPr>
           <p:nvPr>
-            <p:ph idx="1"/>
+            <p:ph type="ftr" sz="quarter" idx="10"/>
           </p:nvPr>
         </p:nvSpPr>
         <p:spPr/>
@@ -4580,14 +5120,499 @@
           <a:bodyPr/>
           <a:lstStyle/>
           <a:p>
-            <a:endParaRPr lang="en-GB"/>
+            <a:pPr>
+              <a:defRPr/>
+            </a:pPr>
+            <a:r>
+              <a:rPr lang="en-GB" dirty="0" smtClean="0"/>
+              <a:t>Mao L., Wang C., Sebastian G. – Ghosts activate on sight</a:t>
+            </a:r>
+            <a:endParaRPr lang="en-GB" dirty="0"/>
+          </a:p>
+        </p:txBody>
+      </p:sp>
+    </p:spTree>
+  </p:cSld>
+  <p:clrMapOvr>
+    <a:masterClrMapping/>
+  </p:clrMapOvr>
+</p:sld>
+</file>
+
+<file path=ppt/slides/slide3.xml><?xml version="1.0" encoding="utf-8"?>
+<p:sld xmlns:a="http://schemas.openxmlformats.org/drawingml/2006/main" xmlns:r="http://schemas.openxmlformats.org/officeDocument/2006/relationships" xmlns:p="http://schemas.openxmlformats.org/presentationml/2006/main">
+  <p:cSld>
+    <p:spTree>
+      <p:nvGrpSpPr>
+        <p:cNvPr id="1" name=""/>
+        <p:cNvGrpSpPr/>
+        <p:nvPr/>
+      </p:nvGrpSpPr>
+      <p:grpSpPr>
+        <a:xfrm>
+          <a:off x="0" y="0"/>
+          <a:ext cx="0" cy="0"/>
+          <a:chOff x="0" y="0"/>
+          <a:chExt cx="0" cy="0"/>
+        </a:xfrm>
+      </p:grpSpPr>
+      <p:sp>
+        <p:nvSpPr>
+          <p:cNvPr id="2" name="Title 1"/>
+          <p:cNvSpPr>
+            <a:spLocks noGrp="1"/>
+          </p:cNvSpPr>
+          <p:nvPr>
+            <p:ph type="title"/>
+          </p:nvPr>
+        </p:nvSpPr>
+        <p:spPr/>
+        <p:txBody>
+          <a:bodyPr/>
+          <a:lstStyle/>
+          <a:p>
+            <a:r>
+              <a:rPr lang="en-GB" dirty="0" smtClean="0"/>
+              <a:t>Our approach</a:t>
+            </a:r>
+            <a:endParaRPr lang="en-GB" dirty="0" smtClean="0"/>
+          </a:p>
+        </p:txBody>
+      </p:sp>
+      <mc:AlternateContent xmlns:mc="http://schemas.openxmlformats.org/markup-compatibility/2006">
+        <mc:Choice xmlns:a14="http://schemas.microsoft.com/office/drawing/2010/main" Requires="a14">
+          <p:sp>
+            <p:nvSpPr>
+              <p:cNvPr id="3" name="Content Placeholder 2"/>
+              <p:cNvSpPr>
+                <a:spLocks noGrp="1"/>
+              </p:cNvSpPr>
+              <p:nvPr>
+                <p:ph idx="1"/>
+              </p:nvPr>
+            </p:nvSpPr>
+            <p:spPr/>
+            <p:txBody>
+              <a:bodyPr>
+                <a:normAutofit/>
+              </a:bodyPr>
+              <a:lstStyle/>
+              <a:p>
+                <a:r>
+                  <a:rPr lang="en-US" dirty="0" smtClean="0"/>
+                  <a:t>OpenStreetMap data for realistic input geometry</a:t>
+                </a:r>
+              </a:p>
+              <a:p>
+                <a:r>
+                  <a:rPr lang="en-US" smtClean="0"/>
+                  <a:t>Java</a:t>
+                </a:r>
+                <a:endParaRPr lang="en-US" dirty="0" smtClean="0"/>
+              </a:p>
+              <a:p>
+                <a:r>
+                  <a:rPr lang="en-US" dirty="0" smtClean="0"/>
+                  <a:t>Outline:</a:t>
+                </a:r>
+              </a:p>
+              <a:p>
+                <a:pPr marL="947737" lvl="1" indent="-514350">
+                  <a:buFont typeface="+mj-lt"/>
+                  <a:buAutoNum type="arabicPeriod"/>
+                </a:pPr>
+                <a:r>
+                  <a:rPr lang="en-US" dirty="0" smtClean="0"/>
+                  <a:t>Parse an OSM file for polygons of buildings</a:t>
+                </a:r>
+              </a:p>
+              <a:p>
+                <a:pPr marL="947737" lvl="1" indent="-514350">
+                  <a:buFont typeface="+mj-lt"/>
+                  <a:buAutoNum type="arabicPeriod"/>
+                </a:pPr>
+                <a:r>
+                  <a:rPr lang="en-US" dirty="0" smtClean="0"/>
+                  <a:t>Triangulate the input polygons</a:t>
+                </a:r>
+              </a:p>
+              <a:p>
+                <a:pPr marL="947737" lvl="1" indent="-514350">
+                  <a:buFont typeface="+mj-lt"/>
+                  <a:buAutoNum type="arabicPeriod"/>
+                </a:pPr>
+                <a:r>
+                  <a:rPr lang="en-US" dirty="0" smtClean="0"/>
+                  <a:t>Build a </a:t>
+                </a:r>
+                <a:r>
+                  <a:rPr lang="en-US" i="1" dirty="0" err="1" smtClean="0"/>
+                  <a:t>kd</a:t>
+                </a:r>
+                <a:r>
+                  <a:rPr lang="en-US" dirty="0" smtClean="0"/>
+                  <a:t>-tree on the triangle soup</a:t>
+                </a:r>
+              </a:p>
+              <a:p>
+                <a:pPr marL="947737" lvl="1" indent="-514350">
+                  <a:buFont typeface="+mj-lt"/>
+                  <a:buAutoNum type="arabicPeriod"/>
+                </a:pPr>
+                <a:r>
+                  <a:rPr lang="en-US" dirty="0" smtClean="0"/>
+                  <a:t>Perform the </a:t>
+                </a:r>
+                <a14:m>
+                  <m:oMath xmlns:m="http://schemas.openxmlformats.org/officeDocument/2006/math">
+                    <m:r>
+                      <a:rPr lang="de-DE" i="1">
+                        <a:latin typeface="Cambria Math" panose="02040503050406030204" pitchFamily="18" charset="0"/>
+                        <a:ea typeface="Cambria Math" panose="02040503050406030204" pitchFamily="18" charset="0"/>
+                      </a:rPr>
+                      <m:t>𝑚</m:t>
+                    </m:r>
+                  </m:oMath>
+                </a14:m>
+                <a:r>
+                  <a:rPr lang="en-US" dirty="0" smtClean="0"/>
+                  <a:t> visibility checks with the help of the </a:t>
+                </a:r>
+                <a:r>
+                  <a:rPr lang="en-US" i="1" dirty="0" err="1" smtClean="0"/>
+                  <a:t>kd</a:t>
+                </a:r>
+                <a:r>
+                  <a:rPr lang="en-US" dirty="0" smtClean="0"/>
+                  <a:t>-tree in </a:t>
+                </a:r>
+                <a14:m>
+                  <m:oMath xmlns:m="http://schemas.openxmlformats.org/officeDocument/2006/math">
+                    <m:r>
+                      <a:rPr lang="en-US" i="1" dirty="0" smtClean="0">
+                        <a:latin typeface="Cambria Math" panose="02040503050406030204" pitchFamily="18" charset="0"/>
+                      </a:rPr>
+                      <m:t>𝑂</m:t>
+                    </m:r>
+                    <m:r>
+                      <a:rPr lang="en-US" i="1" dirty="0" smtClean="0">
+                        <a:latin typeface="Cambria Math" panose="02040503050406030204" pitchFamily="18" charset="0"/>
+                      </a:rPr>
+                      <m:t>(</m:t>
+                    </m:r>
+                    <m:r>
+                      <a:rPr lang="de-DE" b="0" i="1" dirty="0" smtClean="0">
+                        <a:latin typeface="Cambria Math" panose="02040503050406030204" pitchFamily="18" charset="0"/>
+                      </a:rPr>
+                      <m:t>𝑚</m:t>
+                    </m:r>
+                    <m:r>
+                      <a:rPr lang="de-DE" b="0" i="1" dirty="0" smtClean="0">
+                        <a:latin typeface="Cambria Math" panose="02040503050406030204" pitchFamily="18" charset="0"/>
+                      </a:rPr>
+                      <m:t> </m:t>
+                    </m:r>
+                    <m:r>
+                      <m:rPr>
+                        <m:sty m:val="p"/>
+                      </m:rPr>
+                      <a:rPr lang="en-US" i="1" dirty="0" smtClean="0">
+                        <a:latin typeface="Cambria Math" panose="02040503050406030204" pitchFamily="18" charset="0"/>
+                      </a:rPr>
+                      <m:t>log</m:t>
+                    </m:r>
+                    <m:r>
+                      <a:rPr lang="en-US" i="1" dirty="0" smtClean="0">
+                        <a:latin typeface="Cambria Math" panose="02040503050406030204" pitchFamily="18" charset="0"/>
+                      </a:rPr>
+                      <m:t>⁡</m:t>
+                    </m:r>
+                    <m:r>
+                      <a:rPr lang="en-US" i="1" dirty="0" smtClean="0">
+                        <a:latin typeface="Cambria Math" panose="02040503050406030204" pitchFamily="18" charset="0"/>
+                      </a:rPr>
+                      <m:t>𝑛</m:t>
+                    </m:r>
+                    <m:r>
+                      <a:rPr lang="en-US" i="1" dirty="0" smtClean="0">
+                        <a:latin typeface="Cambria Math" panose="02040503050406030204" pitchFamily="18" charset="0"/>
+                      </a:rPr>
+                      <m:t>)</m:t>
+                    </m:r>
+                  </m:oMath>
+                </a14:m>
+                <a:r>
+                  <a:rPr lang="en-US" dirty="0" smtClean="0"/>
+                  <a:t> time</a:t>
+                </a:r>
+              </a:p>
+            </p:txBody>
+          </p:sp>
+        </mc:Choice>
+        <mc:Fallback>
+          <p:sp>
+            <p:nvSpPr>
+              <p:cNvPr id="3" name="Content Placeholder 2"/>
+              <p:cNvSpPr>
+                <a:spLocks noGrp="1" noRot="1" noChangeAspect="1" noMove="1" noResize="1" noEditPoints="1" noAdjustHandles="1" noChangeArrowheads="1" noChangeShapeType="1" noTextEdit="1"/>
+              </p:cNvSpPr>
+              <p:nvPr>
+                <p:ph idx="1"/>
+              </p:nvPr>
+            </p:nvSpPr>
+            <p:spPr>
+              <a:blipFill>
+                <a:blip r:embed="rId3"/>
+                <a:stretch>
+                  <a:fillRect t="-2329" r="-438"/>
+                </a:stretch>
+              </a:blipFill>
+            </p:spPr>
+            <p:txBody>
+              <a:bodyPr/>
+              <a:lstStyle/>
+              <a:p>
+                <a:r>
+                  <a:rPr lang="de-DE">
+                    <a:noFill/>
+                  </a:rPr>
+                  <a:t> </a:t>
+                </a:r>
+              </a:p>
+            </p:txBody>
+          </p:sp>
+        </mc:Fallback>
+      </mc:AlternateContent>
+      <p:sp>
+        <p:nvSpPr>
+          <p:cNvPr id="6" name="Footer Placeholder 5"/>
+          <p:cNvSpPr>
+            <a:spLocks noGrp="1"/>
+          </p:cNvSpPr>
+          <p:nvPr>
+            <p:ph type="ftr" sz="quarter" idx="10"/>
+          </p:nvPr>
+        </p:nvSpPr>
+        <p:spPr/>
+        <p:txBody>
+          <a:bodyPr/>
+          <a:lstStyle/>
+          <a:p>
+            <a:pPr>
+              <a:defRPr/>
+            </a:pPr>
+            <a:r>
+              <a:rPr lang="en-GB" dirty="0" smtClean="0"/>
+              <a:t>Mao L., Wang C., Sebastian G. – Ghosts activate on sight</a:t>
+            </a:r>
+            <a:endParaRPr lang="en-GB" dirty="0"/>
           </a:p>
         </p:txBody>
       </p:sp>
     </p:spTree>
     <p:extLst>
       <p:ext uri="{BB962C8B-B14F-4D97-AF65-F5344CB8AC3E}">
-        <p14:creationId xmlns:p14="http://schemas.microsoft.com/office/powerpoint/2010/main" val="1028804093"/>
+        <p14:creationId xmlns:p14="http://schemas.microsoft.com/office/powerpoint/2010/main" val="3477192276"/>
+      </p:ext>
+    </p:extLst>
+  </p:cSld>
+  <p:clrMapOvr>
+    <a:masterClrMapping/>
+  </p:clrMapOvr>
+</p:sld>
+</file>
+
+<file path=ppt/slides/slide4.xml><?xml version="1.0" encoding="utf-8"?>
+<p:sld xmlns:a="http://schemas.openxmlformats.org/drawingml/2006/main" xmlns:r="http://schemas.openxmlformats.org/officeDocument/2006/relationships" xmlns:p="http://schemas.openxmlformats.org/presentationml/2006/main">
+  <p:cSld>
+    <p:spTree>
+      <p:nvGrpSpPr>
+        <p:cNvPr id="1" name=""/>
+        <p:cNvGrpSpPr/>
+        <p:nvPr/>
+      </p:nvGrpSpPr>
+      <p:grpSpPr>
+        <a:xfrm>
+          <a:off x="0" y="0"/>
+          <a:ext cx="0" cy="0"/>
+          <a:chOff x="0" y="0"/>
+          <a:chExt cx="0" cy="0"/>
+        </a:xfrm>
+      </p:grpSpPr>
+      <p:sp>
+        <p:nvSpPr>
+          <p:cNvPr id="9" name="Textplatzhalter 8"/>
+          <p:cNvSpPr>
+            <a:spLocks noGrp="1"/>
+          </p:cNvSpPr>
+          <p:nvPr>
+            <p:ph type="body" idx="1"/>
+          </p:nvPr>
+        </p:nvSpPr>
+        <p:spPr/>
+        <p:txBody>
+          <a:bodyPr/>
+          <a:lstStyle/>
+          <a:p>
+            <a:r>
+              <a:rPr lang="de-DE" dirty="0" smtClean="0"/>
+              <a:t>DEMO</a:t>
+            </a:r>
+            <a:endParaRPr lang="de-DE" dirty="0"/>
+          </a:p>
+        </p:txBody>
+      </p:sp>
+      <p:sp>
+        <p:nvSpPr>
+          <p:cNvPr id="4" name="Fußzeilenplatzhalter 3"/>
+          <p:cNvSpPr>
+            <a:spLocks noGrp="1"/>
+          </p:cNvSpPr>
+          <p:nvPr>
+            <p:ph type="ftr" sz="quarter" idx="10"/>
+          </p:nvPr>
+        </p:nvSpPr>
+        <p:spPr/>
+        <p:txBody>
+          <a:bodyPr/>
+          <a:lstStyle/>
+          <a:p>
+            <a:pPr>
+              <a:defRPr/>
+            </a:pPr>
+            <a:r>
+              <a:rPr lang="de-DE" smtClean="0"/>
+              <a:t>Mao L., Wang C., Sebastian G. – Ghosts activate on sight</a:t>
+            </a:r>
+            <a:endParaRPr lang="en-US" dirty="0"/>
+          </a:p>
+        </p:txBody>
+      </p:sp>
+      <p:sp>
+        <p:nvSpPr>
+          <p:cNvPr id="10" name="Titel 9"/>
+          <p:cNvSpPr>
+            <a:spLocks noGrp="1"/>
+          </p:cNvSpPr>
+          <p:nvPr>
+            <p:ph type="title"/>
+          </p:nvPr>
+        </p:nvSpPr>
+        <p:spPr/>
+        <p:txBody>
+          <a:bodyPr/>
+          <a:lstStyle/>
+          <a:p>
+            <a:endParaRPr lang="de-DE"/>
+          </a:p>
+        </p:txBody>
+      </p:sp>
+    </p:spTree>
+    <p:extLst>
+      <p:ext uri="{BB962C8B-B14F-4D97-AF65-F5344CB8AC3E}">
+        <p14:creationId xmlns:p14="http://schemas.microsoft.com/office/powerpoint/2010/main" val="1185963703"/>
+      </p:ext>
+    </p:extLst>
+  </p:cSld>
+  <p:clrMapOvr>
+    <a:masterClrMapping/>
+  </p:clrMapOvr>
+</p:sld>
+</file>
+
+<file path=ppt/slides/slide5.xml><?xml version="1.0" encoding="utf-8"?>
+<p:sld xmlns:a="http://schemas.openxmlformats.org/drawingml/2006/main" xmlns:r="http://schemas.openxmlformats.org/officeDocument/2006/relationships" xmlns:p="http://schemas.openxmlformats.org/presentationml/2006/main">
+  <p:cSld>
+    <p:spTree>
+      <p:nvGrpSpPr>
+        <p:cNvPr id="1" name=""/>
+        <p:cNvGrpSpPr/>
+        <p:nvPr/>
+      </p:nvGrpSpPr>
+      <p:grpSpPr>
+        <a:xfrm>
+          <a:off x="0" y="0"/>
+          <a:ext cx="0" cy="0"/>
+          <a:chOff x="0" y="0"/>
+          <a:chExt cx="0" cy="0"/>
+        </a:xfrm>
+      </p:grpSpPr>
+      <p:sp>
+        <p:nvSpPr>
+          <p:cNvPr id="5" name="Titel 4"/>
+          <p:cNvSpPr>
+            <a:spLocks noGrp="1"/>
+          </p:cNvSpPr>
+          <p:nvPr>
+            <p:ph type="title"/>
+          </p:nvPr>
+        </p:nvSpPr>
+        <p:spPr/>
+        <p:txBody>
+          <a:bodyPr/>
+          <a:lstStyle/>
+          <a:p>
+            <a:r>
+              <a:rPr lang="en-GB" dirty="0" smtClean="0"/>
+              <a:t>Section Separator Text</a:t>
+            </a:r>
+            <a:endParaRPr lang="en-GB" dirty="0"/>
+          </a:p>
+        </p:txBody>
+      </p:sp>
+      <p:sp>
+        <p:nvSpPr>
+          <p:cNvPr id="6" name="Textplatzhalter 5"/>
+          <p:cNvSpPr>
+            <a:spLocks noGrp="1"/>
+          </p:cNvSpPr>
+          <p:nvPr>
+            <p:ph type="body" idx="1"/>
+          </p:nvPr>
+        </p:nvSpPr>
+        <p:spPr/>
+        <p:txBody>
+          <a:bodyPr/>
+          <a:lstStyle/>
+          <a:p>
+            <a:r>
+              <a:rPr lang="en-GB" dirty="0" smtClean="0"/>
+              <a:t>THIS IS A SECTION SUBTITLE</a:t>
+            </a:r>
+            <a:endParaRPr lang="en-GB" dirty="0"/>
+          </a:p>
+        </p:txBody>
+      </p:sp>
+      <p:sp>
+        <p:nvSpPr>
+          <p:cNvPr id="4" name="Fußzeilenplatzhalter 3"/>
+          <p:cNvSpPr>
+            <a:spLocks noGrp="1"/>
+          </p:cNvSpPr>
+          <p:nvPr>
+            <p:ph type="ftr" sz="quarter" idx="10"/>
+          </p:nvPr>
+        </p:nvSpPr>
+        <p:spPr/>
+        <p:txBody>
+          <a:bodyPr/>
+          <a:lstStyle/>
+          <a:p>
+            <a:pPr>
+              <a:defRPr/>
+            </a:pPr>
+            <a:r>
+              <a:rPr lang="en-GB" smtClean="0"/>
+              <a:t>Surname Lastname - Presentation Title</a:t>
+            </a:r>
+            <a:endParaRPr lang="en-GB"/>
+          </a:p>
+        </p:txBody>
+      </p:sp>
+    </p:spTree>
+    <p:extLst>
+      <p:ext uri="{BB962C8B-B14F-4D97-AF65-F5344CB8AC3E}">
+        <p14:creationId xmlns:p14="http://schemas.microsoft.com/office/powerpoint/2010/main" val="823908721"/>
       </p:ext>
     </p:extLst>
   </p:cSld>
@@ -4865,7 +5890,7 @@
 </file>
 
 <file path=ppt/theme/theme2.xml><?xml version="1.0" encoding="utf-8"?>
-<a:theme xmlns:a="http://schemas.openxmlformats.org/drawingml/2006/main" name="Larissa">
+<a:theme xmlns:a="http://schemas.openxmlformats.org/drawingml/2006/main" name="Larissa-Design">
   <a:themeElements>
     <a:clrScheme name="">
       <a:dk1>
@@ -4939,7 +5964,6 @@
         <a:font script="Mong" typeface="Mongolian Baiti"/>
         <a:font script="Viet" typeface="Times New Roman"/>
         <a:font script="Uigh" typeface="Microsoft Uighur"/>
-        <a:font script="Geor" typeface="Sylfaen"/>
       </a:majorFont>
       <a:minorFont>
         <a:latin typeface="Calibri"/>
@@ -4974,7 +5998,6 @@
         <a:font script="Mong" typeface="Mongolian Baiti"/>
         <a:font script="Viet" typeface="Arial"/>
         <a:font script="Uigh" typeface="Microsoft Uighur"/>
-        <a:font script="Geor" typeface="Sylfaen"/>
       </a:minorFont>
     </a:fontScheme>
     <a:fmtScheme name="Larissa">
@@ -5150,7 +6173,7 @@
 </file>
 
 <file path=ppt/theme/theme3.xml><?xml version="1.0" encoding="utf-8"?>
-<a:theme xmlns:a="http://schemas.openxmlformats.org/drawingml/2006/main" name="Larissa">
+<a:theme xmlns:a="http://schemas.openxmlformats.org/drawingml/2006/main" name="Larissa-Design">
   <a:themeElements>
     <a:clrScheme name="">
       <a:dk1>
@@ -5224,7 +6247,6 @@
         <a:font script="Mong" typeface="Mongolian Baiti"/>
         <a:font script="Viet" typeface="Times New Roman"/>
         <a:font script="Uigh" typeface="Microsoft Uighur"/>
-        <a:font script="Geor" typeface="Sylfaen"/>
       </a:majorFont>
       <a:minorFont>
         <a:latin typeface="Calibri"/>
@@ -5259,7 +6281,6 @@
         <a:font script="Mong" typeface="Mongolian Baiti"/>
         <a:font script="Viet" typeface="Arial"/>
         <a:font script="Uigh" typeface="Microsoft Uighur"/>
-        <a:font script="Geor" typeface="Sylfaen"/>
       </a:minorFont>
     </a:fontScheme>
     <a:fmtScheme name="Larissa">

</xml_diff>